<commit_message>
added imgproc pics and content
</commit_message>
<xml_diff>
--- a/Presentation/Vehicle-Intersection-Control-Presentation.pptx
+++ b/Presentation/Vehicle-Intersection-Control-Presentation.pptx
@@ -5,7 +5,7 @@
     <p:sldMasterId id="2147483759" r:id="rId1"/>
   </p:sldMasterIdLst>
   <p:notesMasterIdLst>
-    <p:notesMasterId r:id="rId19"/>
+    <p:notesMasterId r:id="rId22"/>
   </p:notesMasterIdLst>
   <p:sldIdLst>
     <p:sldId id="279" r:id="rId2"/>
@@ -17,14 +17,17 @@
     <p:sldId id="303" r:id="rId8"/>
     <p:sldId id="315" r:id="rId9"/>
     <p:sldId id="311" r:id="rId10"/>
-    <p:sldId id="313" r:id="rId11"/>
-    <p:sldId id="312" r:id="rId12"/>
-    <p:sldId id="299" r:id="rId13"/>
-    <p:sldId id="302" r:id="rId14"/>
-    <p:sldId id="304" r:id="rId15"/>
-    <p:sldId id="305" r:id="rId16"/>
-    <p:sldId id="316" r:id="rId17"/>
-    <p:sldId id="282" r:id="rId18"/>
+    <p:sldId id="317" r:id="rId11"/>
+    <p:sldId id="318" r:id="rId12"/>
+    <p:sldId id="319" r:id="rId13"/>
+    <p:sldId id="313" r:id="rId14"/>
+    <p:sldId id="299" r:id="rId15"/>
+    <p:sldId id="312" r:id="rId16"/>
+    <p:sldId id="302" r:id="rId17"/>
+    <p:sldId id="304" r:id="rId18"/>
+    <p:sldId id="305" r:id="rId19"/>
+    <p:sldId id="316" r:id="rId20"/>
+    <p:sldId id="282" r:id="rId21"/>
   </p:sldIdLst>
   <p:sldSz cx="12192000" cy="6858000"/>
   <p:notesSz cx="6858000" cy="9144000"/>
@@ -649,10 +652,9 @@
           <a:lstStyle/>
           <a:p>
             <a:r>
-              <a:rPr lang="en-CA" dirty="0" smtClean="0"/>
+              <a:rPr lang="en-CA" dirty="0"/>
               <a:t>Justin</a:t>
             </a:r>
-            <a:endParaRPr lang="en-CA" dirty="0"/>
           </a:p>
         </p:txBody>
       </p:sp>
@@ -675,14 +677,14 @@
               <a:rPr lang="en-US" smtClean="0"/>
               <a:t>12</a:t>
             </a:fld>
-            <a:endParaRPr lang="en-US" dirty="0"/>
+            <a:endParaRPr lang="en-US"/>
           </a:p>
         </p:txBody>
       </p:sp>
     </p:spTree>
     <p:extLst>
       <p:ext uri="{BB962C8B-B14F-4D97-AF65-F5344CB8AC3E}">
-        <p14:creationId xmlns:p14="http://schemas.microsoft.com/office/powerpoint/2010/main" val="894387723"/>
+        <p14:creationId xmlns:p14="http://schemas.microsoft.com/office/powerpoint/2010/main" val="3450741393"/>
       </p:ext>
     </p:extLst>
   </p:cSld>
@@ -737,10 +739,9 @@
           <a:lstStyle/>
           <a:p>
             <a:r>
-              <a:rPr lang="en-US" dirty="0" smtClean="0"/>
+              <a:rPr lang="en-CA" dirty="0"/>
               <a:t>Justin</a:t>
             </a:r>
-            <a:endParaRPr lang="en-US" dirty="0"/>
           </a:p>
         </p:txBody>
       </p:sp>
@@ -763,14 +764,14 @@
               <a:rPr lang="en-US" smtClean="0"/>
               <a:t>13</a:t>
             </a:fld>
-            <a:endParaRPr lang="en-US" dirty="0"/>
+            <a:endParaRPr lang="en-US"/>
           </a:p>
         </p:txBody>
       </p:sp>
     </p:spTree>
     <p:extLst>
       <p:ext uri="{BB962C8B-B14F-4D97-AF65-F5344CB8AC3E}">
-        <p14:creationId xmlns:p14="http://schemas.microsoft.com/office/powerpoint/2010/main" val="2703337078"/>
+        <p14:creationId xmlns:p14="http://schemas.microsoft.com/office/powerpoint/2010/main" val="3763195157"/>
       </p:ext>
     </p:extLst>
   </p:cSld>
@@ -825,8 +826,8 @@
           <a:lstStyle/>
           <a:p>
             <a:r>
-              <a:rPr lang="en-US" dirty="0"/>
-              <a:t>Radhika</a:t>
+              <a:rPr lang="en-CA" dirty="0"/>
+              <a:t>Justin</a:t>
             </a:r>
           </a:p>
         </p:txBody>
@@ -850,14 +851,14 @@
               <a:rPr lang="en-US" smtClean="0"/>
               <a:t>14</a:t>
             </a:fld>
-            <a:endParaRPr lang="en-US"/>
+            <a:endParaRPr lang="en-US" dirty="0"/>
           </a:p>
         </p:txBody>
       </p:sp>
     </p:spTree>
     <p:extLst>
       <p:ext uri="{BB962C8B-B14F-4D97-AF65-F5344CB8AC3E}">
-        <p14:creationId xmlns:p14="http://schemas.microsoft.com/office/powerpoint/2010/main" val="1964087912"/>
+        <p14:creationId xmlns:p14="http://schemas.microsoft.com/office/powerpoint/2010/main" val="894387723"/>
       </p:ext>
     </p:extLst>
   </p:cSld>
@@ -912,8 +913,8 @@
           <a:lstStyle/>
           <a:p>
             <a:r>
-              <a:rPr lang="en-US" dirty="0"/>
-              <a:t>Radhika </a:t>
+              <a:rPr lang="en-CA" dirty="0"/>
+              <a:t>Justin</a:t>
             </a:r>
           </a:p>
         </p:txBody>
@@ -937,14 +938,14 @@
               <a:rPr lang="en-US" smtClean="0"/>
               <a:t>15</a:t>
             </a:fld>
-            <a:endParaRPr lang="en-US"/>
+            <a:endParaRPr lang="en-US" dirty="0"/>
           </a:p>
         </p:txBody>
       </p:sp>
     </p:spTree>
     <p:extLst>
       <p:ext uri="{BB962C8B-B14F-4D97-AF65-F5344CB8AC3E}">
-        <p14:creationId xmlns:p14="http://schemas.microsoft.com/office/powerpoint/2010/main" val="4015082169"/>
+        <p14:creationId xmlns:p14="http://schemas.microsoft.com/office/powerpoint/2010/main" val="3445560544"/>
       </p:ext>
     </p:extLst>
   </p:cSld>
@@ -998,7 +999,10 @@
           <a:bodyPr/>
           <a:lstStyle/>
           <a:p>
-            <a:endParaRPr lang="en-CA"/>
+            <a:r>
+              <a:rPr lang="en-US" dirty="0"/>
+              <a:t>Alex</a:t>
+            </a:r>
           </a:p>
         </p:txBody>
       </p:sp>
@@ -1019,7 +1023,265 @@
           <a:p>
             <a:fld id="{9FDAE4FC-73CE-4995-A7FF-7ADA8F1DA8FB}" type="slidenum">
               <a:rPr lang="en-US" smtClean="0"/>
+              <a:t>16</a:t>
+            </a:fld>
+            <a:endParaRPr lang="en-US" dirty="0"/>
+          </a:p>
+        </p:txBody>
+      </p:sp>
+    </p:spTree>
+    <p:extLst>
+      <p:ext uri="{BB962C8B-B14F-4D97-AF65-F5344CB8AC3E}">
+        <p14:creationId xmlns:p14="http://schemas.microsoft.com/office/powerpoint/2010/main" val="2703337078"/>
+      </p:ext>
+    </p:extLst>
+  </p:cSld>
+  <p:clrMapOvr>
+    <a:masterClrMapping/>
+  </p:clrMapOvr>
+</p:notes>
+</file>
+
+<file path=ppt/notesSlides/notesSlide15.xml><?xml version="1.0" encoding="utf-8"?>
+<p:notes xmlns:a="http://schemas.openxmlformats.org/drawingml/2006/main" xmlns:r="http://schemas.openxmlformats.org/officeDocument/2006/relationships" xmlns:p="http://schemas.openxmlformats.org/presentationml/2006/main">
+  <p:cSld>
+    <p:spTree>
+      <p:nvGrpSpPr>
+        <p:cNvPr id="1" name=""/>
+        <p:cNvGrpSpPr/>
+        <p:nvPr/>
+      </p:nvGrpSpPr>
+      <p:grpSpPr>
+        <a:xfrm>
+          <a:off x="0" y="0"/>
+          <a:ext cx="0" cy="0"/>
+          <a:chOff x="0" y="0"/>
+          <a:chExt cx="0" cy="0"/>
+        </a:xfrm>
+      </p:grpSpPr>
+      <p:sp>
+        <p:nvSpPr>
+          <p:cNvPr id="2" name="Slide Image Placeholder 1"/>
+          <p:cNvSpPr>
+            <a:spLocks noGrp="1" noRot="1" noChangeAspect="1"/>
+          </p:cNvSpPr>
+          <p:nvPr>
+            <p:ph type="sldImg"/>
+          </p:nvPr>
+        </p:nvSpPr>
+        <p:spPr/>
+      </p:sp>
+      <p:sp>
+        <p:nvSpPr>
+          <p:cNvPr id="3" name="Notes Placeholder 2"/>
+          <p:cNvSpPr>
+            <a:spLocks noGrp="1"/>
+          </p:cNvSpPr>
+          <p:nvPr>
+            <p:ph type="body" idx="1"/>
+          </p:nvPr>
+        </p:nvSpPr>
+        <p:spPr/>
+        <p:txBody>
+          <a:bodyPr/>
+          <a:lstStyle/>
+          <a:p>
+            <a:r>
+              <a:rPr lang="en-US" dirty="0"/>
+              <a:t>Radhika</a:t>
+            </a:r>
+          </a:p>
+        </p:txBody>
+      </p:sp>
+      <p:sp>
+        <p:nvSpPr>
+          <p:cNvPr id="4" name="Slide Number Placeholder 3"/>
+          <p:cNvSpPr>
+            <a:spLocks noGrp="1"/>
+          </p:cNvSpPr>
+          <p:nvPr>
+            <p:ph type="sldNum" sz="quarter" idx="10"/>
+          </p:nvPr>
+        </p:nvSpPr>
+        <p:spPr/>
+        <p:txBody>
+          <a:bodyPr/>
+          <a:lstStyle/>
+          <a:p>
+            <a:fld id="{9FDAE4FC-73CE-4995-A7FF-7ADA8F1DA8FB}" type="slidenum">
+              <a:rPr lang="en-US" smtClean="0"/>
               <a:t>17</a:t>
+            </a:fld>
+            <a:endParaRPr lang="en-US"/>
+          </a:p>
+        </p:txBody>
+      </p:sp>
+    </p:spTree>
+    <p:extLst>
+      <p:ext uri="{BB962C8B-B14F-4D97-AF65-F5344CB8AC3E}">
+        <p14:creationId xmlns:p14="http://schemas.microsoft.com/office/powerpoint/2010/main" val="1964087912"/>
+      </p:ext>
+    </p:extLst>
+  </p:cSld>
+  <p:clrMapOvr>
+    <a:masterClrMapping/>
+  </p:clrMapOvr>
+</p:notes>
+</file>
+
+<file path=ppt/notesSlides/notesSlide16.xml><?xml version="1.0" encoding="utf-8"?>
+<p:notes xmlns:a="http://schemas.openxmlformats.org/drawingml/2006/main" xmlns:r="http://schemas.openxmlformats.org/officeDocument/2006/relationships" xmlns:p="http://schemas.openxmlformats.org/presentationml/2006/main">
+  <p:cSld>
+    <p:spTree>
+      <p:nvGrpSpPr>
+        <p:cNvPr id="1" name=""/>
+        <p:cNvGrpSpPr/>
+        <p:nvPr/>
+      </p:nvGrpSpPr>
+      <p:grpSpPr>
+        <a:xfrm>
+          <a:off x="0" y="0"/>
+          <a:ext cx="0" cy="0"/>
+          <a:chOff x="0" y="0"/>
+          <a:chExt cx="0" cy="0"/>
+        </a:xfrm>
+      </p:grpSpPr>
+      <p:sp>
+        <p:nvSpPr>
+          <p:cNvPr id="2" name="Slide Image Placeholder 1"/>
+          <p:cNvSpPr>
+            <a:spLocks noGrp="1" noRot="1" noChangeAspect="1"/>
+          </p:cNvSpPr>
+          <p:nvPr>
+            <p:ph type="sldImg"/>
+          </p:nvPr>
+        </p:nvSpPr>
+        <p:spPr/>
+      </p:sp>
+      <p:sp>
+        <p:nvSpPr>
+          <p:cNvPr id="3" name="Notes Placeholder 2"/>
+          <p:cNvSpPr>
+            <a:spLocks noGrp="1"/>
+          </p:cNvSpPr>
+          <p:nvPr>
+            <p:ph type="body" idx="1"/>
+          </p:nvPr>
+        </p:nvSpPr>
+        <p:spPr/>
+        <p:txBody>
+          <a:bodyPr/>
+          <a:lstStyle/>
+          <a:p>
+            <a:r>
+              <a:rPr lang="en-US" dirty="0"/>
+              <a:t>Radhika </a:t>
+            </a:r>
+          </a:p>
+        </p:txBody>
+      </p:sp>
+      <p:sp>
+        <p:nvSpPr>
+          <p:cNvPr id="4" name="Slide Number Placeholder 3"/>
+          <p:cNvSpPr>
+            <a:spLocks noGrp="1"/>
+          </p:cNvSpPr>
+          <p:nvPr>
+            <p:ph type="sldNum" sz="quarter" idx="10"/>
+          </p:nvPr>
+        </p:nvSpPr>
+        <p:spPr/>
+        <p:txBody>
+          <a:bodyPr/>
+          <a:lstStyle/>
+          <a:p>
+            <a:fld id="{9FDAE4FC-73CE-4995-A7FF-7ADA8F1DA8FB}" type="slidenum">
+              <a:rPr lang="en-US" smtClean="0"/>
+              <a:t>18</a:t>
+            </a:fld>
+            <a:endParaRPr lang="en-US"/>
+          </a:p>
+        </p:txBody>
+      </p:sp>
+    </p:spTree>
+    <p:extLst>
+      <p:ext uri="{BB962C8B-B14F-4D97-AF65-F5344CB8AC3E}">
+        <p14:creationId xmlns:p14="http://schemas.microsoft.com/office/powerpoint/2010/main" val="4015082169"/>
+      </p:ext>
+    </p:extLst>
+  </p:cSld>
+  <p:clrMapOvr>
+    <a:masterClrMapping/>
+  </p:clrMapOvr>
+</p:notes>
+</file>
+
+<file path=ppt/notesSlides/notesSlide17.xml><?xml version="1.0" encoding="utf-8"?>
+<p:notes xmlns:a="http://schemas.openxmlformats.org/drawingml/2006/main" xmlns:r="http://schemas.openxmlformats.org/officeDocument/2006/relationships" xmlns:p="http://schemas.openxmlformats.org/presentationml/2006/main">
+  <p:cSld>
+    <p:spTree>
+      <p:nvGrpSpPr>
+        <p:cNvPr id="1" name=""/>
+        <p:cNvGrpSpPr/>
+        <p:nvPr/>
+      </p:nvGrpSpPr>
+      <p:grpSpPr>
+        <a:xfrm>
+          <a:off x="0" y="0"/>
+          <a:ext cx="0" cy="0"/>
+          <a:chOff x="0" y="0"/>
+          <a:chExt cx="0" cy="0"/>
+        </a:xfrm>
+      </p:grpSpPr>
+      <p:sp>
+        <p:nvSpPr>
+          <p:cNvPr id="2" name="Slide Image Placeholder 1"/>
+          <p:cNvSpPr>
+            <a:spLocks noGrp="1" noRot="1" noChangeAspect="1"/>
+          </p:cNvSpPr>
+          <p:nvPr>
+            <p:ph type="sldImg"/>
+          </p:nvPr>
+        </p:nvSpPr>
+        <p:spPr/>
+      </p:sp>
+      <p:sp>
+        <p:nvSpPr>
+          <p:cNvPr id="3" name="Notes Placeholder 2"/>
+          <p:cNvSpPr>
+            <a:spLocks noGrp="1"/>
+          </p:cNvSpPr>
+          <p:nvPr>
+            <p:ph type="body" idx="1"/>
+          </p:nvPr>
+        </p:nvSpPr>
+        <p:spPr/>
+        <p:txBody>
+          <a:bodyPr/>
+          <a:lstStyle/>
+          <a:p>
+            <a:endParaRPr lang="en-CA"/>
+          </a:p>
+        </p:txBody>
+      </p:sp>
+      <p:sp>
+        <p:nvSpPr>
+          <p:cNvPr id="4" name="Slide Number Placeholder 3"/>
+          <p:cNvSpPr>
+            <a:spLocks noGrp="1"/>
+          </p:cNvSpPr>
+          <p:nvPr>
+            <p:ph type="sldNum" sz="quarter" idx="10"/>
+          </p:nvPr>
+        </p:nvSpPr>
+        <p:spPr/>
+        <p:txBody>
+          <a:bodyPr/>
+          <a:lstStyle/>
+          <a:p>
+            <a:fld id="{9FDAE4FC-73CE-4995-A7FF-7ADA8F1DA8FB}" type="slidenum">
+              <a:rPr lang="en-US" smtClean="0"/>
+              <a:t>20</a:t>
             </a:fld>
             <a:endParaRPr lang="en-US"/>
           </a:p>
@@ -1155,14 +1417,14 @@
             <a:endParaRPr lang="en-US" baseline="0" dirty="0"/>
           </a:p>
           <a:p>
-            <a:endParaRPr lang="en-US" dirty="0" smtClean="0"/>
-          </a:p>
-          <a:p>
-            <a:endParaRPr lang="en-US" dirty="0" smtClean="0"/>
+            <a:endParaRPr lang="en-US" dirty="0"/>
+          </a:p>
+          <a:p>
+            <a:endParaRPr lang="en-US" dirty="0"/>
           </a:p>
           <a:p>
             <a:r>
-              <a:rPr lang="en-US" dirty="0" smtClean="0"/>
+              <a:rPr lang="en-US" dirty="0"/>
               <a:t>Zach</a:t>
             </a:r>
           </a:p>
@@ -1172,15 +1434,15 @@
               <a:buChar char="-"/>
             </a:pPr>
             <a:r>
-              <a:rPr lang="en-CA" dirty="0" smtClean="0"/>
+              <a:rPr lang="en-CA" dirty="0"/>
               <a:t>Animation</a:t>
             </a:r>
             <a:r>
-              <a:rPr lang="en-CA" baseline="0" dirty="0" smtClean="0"/>
+              <a:rPr lang="en-CA" baseline="0" dirty="0"/>
               <a:t> shows that there is two parts too the system</a:t>
             </a:r>
             <a:r>
-              <a:rPr lang="en-US" baseline="0" dirty="0" smtClean="0"/>
+              <a:rPr lang="en-US" baseline="0" dirty="0"/>
               <a:t> (Intersection component and vehicle component)</a:t>
             </a:r>
           </a:p>
@@ -1190,7 +1452,7 @@
               <a:buChar char="-"/>
             </a:pPr>
             <a:r>
-              <a:rPr lang="en-CA" baseline="0" dirty="0" smtClean="0"/>
+              <a:rPr lang="en-CA" baseline="0" dirty="0"/>
               <a:t>The intersection controller is responsible for managing traffic flow and monitoring the intersection</a:t>
             </a:r>
           </a:p>
@@ -1200,7 +1462,7 @@
               <a:buChar char="-"/>
             </a:pPr>
             <a:r>
-              <a:rPr lang="en-CA" baseline="0" dirty="0" smtClean="0"/>
+              <a:rPr lang="en-CA" baseline="0" dirty="0"/>
               <a:t>This communicates with the vehicle controller</a:t>
             </a:r>
           </a:p>
@@ -1210,7 +1472,7 @@
               <a:buChar char="-"/>
             </a:pPr>
             <a:r>
-              <a:rPr lang="en-CA" baseline="0" dirty="0" smtClean="0"/>
+              <a:rPr lang="en-CA" baseline="0" dirty="0"/>
               <a:t>Vehicle controller sends requests and intersection controller sends back over Bluetooth communication </a:t>
             </a:r>
           </a:p>
@@ -1220,7 +1482,7 @@
               <a:buChar char="-"/>
             </a:pPr>
             <a:r>
-              <a:rPr lang="en-CA" baseline="0" dirty="0" smtClean="0"/>
+              <a:rPr lang="en-CA" baseline="0" dirty="0"/>
               <a:t>Vehicle controller is also for managing and navigating the vehicle on the track </a:t>
             </a:r>
           </a:p>
@@ -1571,10 +1833,9 @@
           <a:lstStyle/>
           <a:p>
             <a:r>
-              <a:rPr lang="en-CA" dirty="0" smtClean="0"/>
+              <a:rPr lang="en-CA" dirty="0"/>
               <a:t>Alex</a:t>
             </a:r>
-            <a:endParaRPr lang="en-CA" dirty="0"/>
           </a:p>
         </p:txBody>
       </p:sp>
@@ -1659,7 +1920,7 @@
           <a:lstStyle/>
           <a:p>
             <a:r>
-              <a:rPr lang="en-CA" dirty="0" smtClean="0"/>
+              <a:rPr lang="en-CA" dirty="0"/>
               <a:t>Alex</a:t>
             </a:r>
           </a:p>
@@ -1749,10 +2010,9 @@
           <a:lstStyle/>
           <a:p>
             <a:r>
-              <a:rPr lang="en-CA" dirty="0" smtClean="0"/>
+              <a:rPr lang="en-CA" dirty="0"/>
               <a:t>Justin</a:t>
             </a:r>
-            <a:endParaRPr lang="en-CA" dirty="0"/>
           </a:p>
         </p:txBody>
       </p:sp>
@@ -1782,7 +2042,7 @@
     </p:spTree>
     <p:extLst>
       <p:ext uri="{BB962C8B-B14F-4D97-AF65-F5344CB8AC3E}">
-        <p14:creationId xmlns:p14="http://schemas.microsoft.com/office/powerpoint/2010/main" val="3763195157"/>
+        <p14:creationId xmlns:p14="http://schemas.microsoft.com/office/powerpoint/2010/main" val="2243502296"/>
       </p:ext>
     </p:extLst>
   </p:cSld>
@@ -1837,10 +2097,9 @@
           <a:lstStyle/>
           <a:p>
             <a:r>
-              <a:rPr lang="en-CA" dirty="0" smtClean="0"/>
+              <a:rPr lang="en-CA" dirty="0"/>
               <a:t>Justin</a:t>
             </a:r>
-            <a:endParaRPr lang="en-CA" dirty="0"/>
           </a:p>
         </p:txBody>
       </p:sp>
@@ -1870,7 +2129,7 @@
     </p:spTree>
     <p:extLst>
       <p:ext uri="{BB962C8B-B14F-4D97-AF65-F5344CB8AC3E}">
-        <p14:creationId xmlns:p14="http://schemas.microsoft.com/office/powerpoint/2010/main" val="3445560544"/>
+        <p14:creationId xmlns:p14="http://schemas.microsoft.com/office/powerpoint/2010/main" val="1466382255"/>
       </p:ext>
     </p:extLst>
   </p:cSld>
@@ -8601,7 +8860,7 @@
           <p:nvPr>
             <p:extLst>
               <p:ext uri="{386F3935-93C4-4BCD-93E2-E3B085C9AB24}">
-                <p16:designElem xmlns:p16="http://schemas.microsoft.com/office/powerpoint/2015/main" xmlns="" val="1"/>
+                <p16:designElem xmlns:p16="http://schemas.microsoft.com/office/powerpoint/2015/main" val="1"/>
               </p:ext>
             </p:extLst>
           </p:nvPr>
@@ -8751,7 +9010,7 @@
           <p:nvPr>
             <p:extLst>
               <p:ext uri="{386F3935-93C4-4BCD-93E2-E3B085C9AB24}">
-                <p16:designElem xmlns:p16="http://schemas.microsoft.com/office/powerpoint/2015/main" xmlns="" val="1"/>
+                <p16:designElem xmlns:p16="http://schemas.microsoft.com/office/powerpoint/2015/main" val="1"/>
               </p:ext>
             </p:extLst>
           </p:nvPr>
@@ -9223,7 +9482,7 @@
           <p:nvPr>
             <p:extLst>
               <p:ext uri="{386F3935-93C4-4BCD-93E2-E3B085C9AB24}">
-                <p16:designElem xmlns:p16="http://schemas.microsoft.com/office/powerpoint/2015/main" xmlns="" val="1"/>
+                <p16:designElem xmlns:p16="http://schemas.microsoft.com/office/powerpoint/2015/main" val="1"/>
               </p:ext>
             </p:extLst>
           </p:nvPr>
@@ -9930,7 +10189,7 @@
         </p:nvSpPr>
         <p:spPr>
           <a:xfrm>
-            <a:off x="406648" y="263130"/>
+            <a:off x="406648" y="212330"/>
             <a:ext cx="3749342" cy="2283863"/>
           </a:xfrm>
           <a:prstGeom prst="rect">
@@ -10175,8 +10434,21 @@
                   <a:srgbClr val="2A1A00"/>
                 </a:solidFill>
               </a:rPr>
-              <a:t>Alex Jackson</a:t>
+              <a:t>Zachary </a:t>
             </a:r>
+            <a:r>
+              <a:rPr lang="en-CA" sz="1600" dirty="0" err="1">
+                <a:solidFill>
+                  <a:srgbClr val="2A1A00"/>
+                </a:solidFill>
+              </a:rPr>
+              <a:t>Bazen</a:t>
+            </a:r>
+            <a:endParaRPr lang="en-US" sz="1600" dirty="0">
+              <a:solidFill>
+                <a:srgbClr val="2A1A00"/>
+              </a:solidFill>
+            </a:endParaRPr>
           </a:p>
           <a:p>
             <a:r>
@@ -10185,7 +10457,17 @@
                   <a:srgbClr val="2A1A00"/>
                 </a:solidFill>
               </a:rPr>
-              <a:t>Jean Lucas Ferreira</a:t>
+              <a:t>Jean-Lucas Ferreira</a:t>
+            </a:r>
+          </a:p>
+          <a:p>
+            <a:r>
+              <a:rPr lang="en-CA" sz="1600" dirty="0">
+                <a:solidFill>
+                  <a:srgbClr val="2A1A00"/>
+                </a:solidFill>
+              </a:rPr>
+              <a:t>Alex Jackson</a:t>
             </a:r>
           </a:p>
           <a:p>
@@ -10205,8 +10487,21 @@
                   <a:srgbClr val="2A1A00"/>
                 </a:solidFill>
               </a:rPr>
-              <a:t>Mathew Hobers</a:t>
+              <a:t>Mathew </a:t>
             </a:r>
+            <a:r>
+              <a:rPr lang="en-CA" sz="1600" dirty="0" err="1">
+                <a:solidFill>
+                  <a:srgbClr val="2A1A00"/>
+                </a:solidFill>
+              </a:rPr>
+              <a:t>Hobers</a:t>
+            </a:r>
+            <a:endParaRPr lang="en-CA" sz="1600" dirty="0">
+              <a:solidFill>
+                <a:srgbClr val="2A1A00"/>
+              </a:solidFill>
+            </a:endParaRPr>
           </a:p>
           <a:p>
             <a:r>
@@ -10217,21 +10512,6 @@
               </a:rPr>
               <a:t>Radhika Sharma</a:t>
             </a:r>
-          </a:p>
-          <a:p>
-            <a:r>
-              <a:rPr lang="en-CA" sz="1600" dirty="0">
-                <a:solidFill>
-                  <a:srgbClr val="2A1A00"/>
-                </a:solidFill>
-              </a:rPr>
-              <a:t>Zachary Bazen</a:t>
-            </a:r>
-            <a:endParaRPr lang="en-US" sz="1600" dirty="0">
-              <a:solidFill>
-                <a:srgbClr val="2A1A00"/>
-              </a:solidFill>
-            </a:endParaRPr>
           </a:p>
         </p:txBody>
       </p:sp>
@@ -10321,13 +10601,6 @@
   <p:clrMapOvr>
     <a:masterClrMapping/>
   </p:clrMapOvr>
-  <p:timing>
-    <p:tnLst>
-      <p:par>
-        <p:cTn id="1" dur="indefinite" restart="never" nodeType="tmRoot"/>
-      </p:par>
-    </p:tnLst>
-  </p:timing>
 </p:sld>
 </file>
 
@@ -10364,38 +10637,127 @@
           <a:lstStyle/>
           <a:p>
             <a:r>
-              <a:rPr lang="en-US" b="1" dirty="0" smtClean="0"/>
-              <a:t> VC - Image processing</a:t>
+              <a:rPr lang="en-CA" dirty="0"/>
+              <a:t>VC – Image Processing (1)</a:t>
             </a:r>
+          </a:p>
+        </p:txBody>
+      </p:sp>
+      <p:pic>
+        <p:nvPicPr>
+          <p:cNvPr id="6" name="Content Placeholder 5"/>
+          <p:cNvPicPr>
+            <a:picLocks noGrp="1" noChangeAspect="1"/>
+          </p:cNvPicPr>
+          <p:nvPr>
+            <p:ph sz="half" idx="1"/>
+          </p:nvPr>
+        </p:nvPicPr>
+        <p:blipFill>
+          <a:blip r:embed="rId3">
+            <a:extLst>
+              <a:ext uri="{28A0092B-C50C-407E-A947-70E740481C1C}">
+                <a14:useLocalDpi xmlns:a14="http://schemas.microsoft.com/office/drawing/2010/main" val="0"/>
+              </a:ext>
+            </a:extLst>
+          </a:blip>
+          <a:stretch>
+            <a:fillRect/>
+          </a:stretch>
+        </p:blipFill>
+        <p:spPr>
+          <a:xfrm>
+            <a:off x="1257300" y="2295525"/>
+            <a:ext cx="4800600" cy="3600450"/>
+          </a:xfrm>
+        </p:spPr>
+      </p:pic>
+      <p:pic>
+        <p:nvPicPr>
+          <p:cNvPr id="8" name="Content Placeholder 7"/>
+          <p:cNvPicPr>
+            <a:picLocks noGrp="1" noChangeAspect="1"/>
+          </p:cNvPicPr>
+          <p:nvPr>
+            <p:ph sz="half" idx="2"/>
+          </p:nvPr>
+        </p:nvPicPr>
+        <p:blipFill>
+          <a:blip r:embed="rId4">
+            <a:extLst>
+              <a:ext uri="{28A0092B-C50C-407E-A947-70E740481C1C}">
+                <a14:useLocalDpi xmlns:a14="http://schemas.microsoft.com/office/drawing/2010/main" val="0"/>
+              </a:ext>
+            </a:extLst>
+          </a:blip>
+          <a:stretch>
+            <a:fillRect/>
+          </a:stretch>
+        </p:blipFill>
+        <p:spPr>
+          <a:xfrm>
+            <a:off x="6648450" y="2925604"/>
+            <a:ext cx="4800600" cy="2340292"/>
+          </a:xfrm>
+        </p:spPr>
+      </p:pic>
+      <p:sp>
+        <p:nvSpPr>
+          <p:cNvPr id="9" name="TextBox 8"/>
+          <p:cNvSpPr txBox="1"/>
+          <p:nvPr/>
+        </p:nvSpPr>
+        <p:spPr>
+          <a:xfrm>
+            <a:off x="2402864" y="1833860"/>
+            <a:ext cx="2509470" cy="461665"/>
+          </a:xfrm>
+          <a:prstGeom prst="rect">
+            <a:avLst/>
+          </a:prstGeom>
+          <a:noFill/>
+        </p:spPr>
+        <p:txBody>
+          <a:bodyPr wrap="none" rtlCol="0">
+            <a:spAutoFit/>
+          </a:bodyPr>
+          <a:lstStyle/>
+          <a:p>
+            <a:pPr algn="ctr"/>
             <a:r>
-              <a:rPr lang="en-US" b="1" dirty="0"/>
-              <a:t/>
+              <a:rPr lang="en-CA" sz="2400" dirty="0"/>
+              <a:t>1) Captured Image</a:t>
             </a:r>
-            <a:br>
-              <a:rPr lang="en-US" b="1" dirty="0"/>
-            </a:br>
             <a:endParaRPr lang="en-CA" dirty="0"/>
           </a:p>
         </p:txBody>
       </p:sp>
       <p:sp>
         <p:nvSpPr>
-          <p:cNvPr id="3" name="Content Placeholder 2"/>
-          <p:cNvSpPr>
-            <a:spLocks noGrp="1"/>
-          </p:cNvSpPr>
-          <p:nvPr>
-            <p:ph idx="1"/>
-          </p:nvPr>
-        </p:nvSpPr>
-        <p:spPr/>
-        <p:txBody>
-          <a:bodyPr/>
+          <p:cNvPr id="11" name="TextBox 10"/>
+          <p:cNvSpPr txBox="1"/>
+          <p:nvPr/>
+        </p:nvSpPr>
+        <p:spPr>
+          <a:xfrm>
+            <a:off x="7825338" y="1833859"/>
+            <a:ext cx="2446824" cy="461665"/>
+          </a:xfrm>
+          <a:prstGeom prst="rect">
+            <a:avLst/>
+          </a:prstGeom>
+          <a:noFill/>
+        </p:spPr>
+        <p:txBody>
+          <a:bodyPr wrap="none" rtlCol="0">
+            <a:spAutoFit/>
+          </a:bodyPr>
           <a:lstStyle/>
           <a:p>
+            <a:pPr algn="ctr"/>
             <a:r>
-              <a:rPr lang="en-CA" dirty="0" smtClean="0"/>
-              <a:t>TODO</a:t>
+              <a:rPr lang="en-CA" sz="2400" dirty="0"/>
+              <a:t>2) Cropped Image</a:t>
             </a:r>
             <a:endParaRPr lang="en-CA" dirty="0"/>
           </a:p>
@@ -10404,7 +10766,7 @@
     </p:spTree>
     <p:extLst>
       <p:ext uri="{BB962C8B-B14F-4D97-AF65-F5344CB8AC3E}">
-        <p14:creationId xmlns:p14="http://schemas.microsoft.com/office/powerpoint/2010/main" val="2985287176"/>
+        <p14:creationId xmlns:p14="http://schemas.microsoft.com/office/powerpoint/2010/main" val="3139489090"/>
       </p:ext>
     </p:extLst>
   </p:cSld>
@@ -10443,144 +10805,25 @@
         </p:nvSpPr>
         <p:spPr/>
         <p:txBody>
-          <a:bodyPr>
-            <a:noAutofit/>
-          </a:bodyPr>
+          <a:bodyPr/>
           <a:lstStyle/>
           <a:p>
             <a:r>
-              <a:rPr lang="en-US" b="1" dirty="0" smtClean="0"/>
-              <a:t>VC - Hardware </a:t>
+              <a:rPr lang="en-CA" dirty="0"/>
+              <a:t>VC – Image Processing (2)</a:t>
             </a:r>
-            <a:r>
-              <a:rPr lang="en-US" b="1" dirty="0"/>
-              <a:t>Interfacing </a:t>
-            </a:r>
-            <a:br>
-              <a:rPr lang="en-US" b="1" dirty="0"/>
-            </a:br>
-            <a:endParaRPr lang="en-CA" dirty="0"/>
-          </a:p>
-        </p:txBody>
-      </p:sp>
-      <p:sp>
-        <p:nvSpPr>
-          <p:cNvPr id="3" name="Content Placeholder 2"/>
-          <p:cNvSpPr>
-            <a:spLocks noGrp="1"/>
-          </p:cNvSpPr>
+          </a:p>
+        </p:txBody>
+      </p:sp>
+      <p:pic>
+        <p:nvPicPr>
+          <p:cNvPr id="5" name="Content Placeholder 4"/>
+          <p:cNvPicPr>
+            <a:picLocks noGrp="1" noChangeAspect="1"/>
+          </p:cNvPicPr>
           <p:nvPr>
             <p:ph idx="1"/>
           </p:nvPr>
-        </p:nvSpPr>
-        <p:spPr>
-          <a:xfrm>
-            <a:off x="1251678" y="1755423"/>
-            <a:ext cx="10178322" cy="3593591"/>
-          </a:xfrm>
-        </p:spPr>
-        <p:txBody>
-          <a:bodyPr>
-            <a:normAutofit/>
-          </a:bodyPr>
-          <a:lstStyle/>
-          <a:p>
-            <a:r>
-              <a:rPr lang="en-CA" sz="2800" dirty="0" smtClean="0">
-                <a:solidFill>
-                  <a:schemeClr val="tx1"/>
-                </a:solidFill>
-              </a:rPr>
-              <a:t>Raspberry Pi 3</a:t>
-            </a:r>
-          </a:p>
-          <a:p>
-            <a:r>
-              <a:rPr lang="en-CA" sz="2800" dirty="0" smtClean="0">
-                <a:solidFill>
-                  <a:schemeClr val="tx1"/>
-                </a:solidFill>
-              </a:rPr>
-              <a:t>Servo </a:t>
-            </a:r>
-          </a:p>
-          <a:p>
-            <a:r>
-              <a:rPr lang="en-CA" sz="2800" dirty="0" smtClean="0">
-                <a:solidFill>
-                  <a:schemeClr val="tx1"/>
-                </a:solidFill>
-              </a:rPr>
-              <a:t>Speed Controller</a:t>
-            </a:r>
-          </a:p>
-          <a:p>
-            <a:r>
-              <a:rPr lang="en-CA" sz="2800" dirty="0" smtClean="0">
-                <a:solidFill>
-                  <a:schemeClr val="tx1"/>
-                </a:solidFill>
-              </a:rPr>
-              <a:t>Ultrasonic Sensor (HC-SR04)</a:t>
-            </a:r>
-          </a:p>
-        </p:txBody>
-      </p:sp>
-      <p:sp>
-        <p:nvSpPr>
-          <p:cNvPr id="9" name="Rounded Rectangle 8"/>
-          <p:cNvSpPr/>
-          <p:nvPr/>
-        </p:nvSpPr>
-        <p:spPr>
-          <a:xfrm>
-            <a:off x="927817" y="4095946"/>
-            <a:ext cx="10826044" cy="2506133"/>
-          </a:xfrm>
-          <a:prstGeom prst="roundRect">
-            <a:avLst/>
-          </a:prstGeom>
-          <a:solidFill>
-            <a:schemeClr val="bg1"/>
-          </a:solidFill>
-          <a:ln>
-            <a:solidFill>
-              <a:schemeClr val="tx1"/>
-            </a:solidFill>
-          </a:ln>
-        </p:spPr>
-        <p:style>
-          <a:lnRef idx="2">
-            <a:schemeClr val="accent1">
-              <a:shade val="50000"/>
-            </a:schemeClr>
-          </a:lnRef>
-          <a:fillRef idx="1">
-            <a:schemeClr val="accent1"/>
-          </a:fillRef>
-          <a:effectRef idx="0">
-            <a:schemeClr val="accent1"/>
-          </a:effectRef>
-          <a:fontRef idx="minor">
-            <a:schemeClr val="lt1"/>
-          </a:fontRef>
-        </p:style>
-        <p:txBody>
-          <a:bodyPr rtlCol="0" anchor="ctr"/>
-          <a:lstStyle/>
-          <a:p>
-            <a:pPr algn="ctr"/>
-            <a:endParaRPr lang="en-CA"/>
-          </a:p>
-        </p:txBody>
-      </p:sp>
-      <p:pic>
-        <p:nvPicPr>
-          <p:cNvPr id="4" name="Picture 3"/>
-          <p:cNvPicPr>
-            <a:picLocks noChangeAspect="1"/>
-          </p:cNvPicPr>
-          <p:nvPr/>
         </p:nvPicPr>
         <p:blipFill>
           <a:blip r:embed="rId3">
@@ -10596,108 +10839,46 @@
         </p:blipFill>
         <p:spPr>
           <a:xfrm>
-            <a:off x="9028112" y="4700939"/>
-            <a:ext cx="2548644" cy="1515173"/>
+            <a:off x="3292475" y="2597150"/>
+            <a:ext cx="6096000" cy="2971800"/>
+          </a:xfrm>
+        </p:spPr>
+      </p:pic>
+      <p:sp>
+        <p:nvSpPr>
+          <p:cNvPr id="6" name="TextBox 5"/>
+          <p:cNvSpPr txBox="1"/>
+          <p:nvPr/>
+        </p:nvSpPr>
+        <p:spPr>
+          <a:xfrm>
+            <a:off x="5100391" y="2005001"/>
+            <a:ext cx="2480167" cy="461665"/>
           </a:xfrm>
           <a:prstGeom prst="rect">
             <a:avLst/>
           </a:prstGeom>
+          <a:noFill/>
         </p:spPr>
-      </p:pic>
-      <p:pic>
-        <p:nvPicPr>
-          <p:cNvPr id="5" name="Picture 4"/>
-          <p:cNvPicPr>
-            <a:picLocks noChangeAspect="1"/>
-          </p:cNvPicPr>
-          <p:nvPr/>
-        </p:nvPicPr>
-        <p:blipFill>
-          <a:blip r:embed="rId4">
-            <a:extLst>
-              <a:ext uri="{28A0092B-C50C-407E-A947-70E740481C1C}">
-                <a14:useLocalDpi xmlns:a14="http://schemas.microsoft.com/office/drawing/2010/main" val="0"/>
-              </a:ext>
-            </a:extLst>
-          </a:blip>
-          <a:stretch>
-            <a:fillRect/>
-          </a:stretch>
-        </p:blipFill>
-        <p:spPr>
-          <a:xfrm>
-            <a:off x="4039671" y="4576844"/>
-            <a:ext cx="2301168" cy="1544339"/>
-          </a:xfrm>
-          <a:prstGeom prst="rect">
-            <a:avLst/>
-          </a:prstGeom>
-        </p:spPr>
-      </p:pic>
-      <p:pic>
-        <p:nvPicPr>
-          <p:cNvPr id="7" name="Picture 6"/>
-          <p:cNvPicPr>
-            <a:picLocks noChangeAspect="1"/>
-          </p:cNvPicPr>
-          <p:nvPr/>
-        </p:nvPicPr>
-        <p:blipFill>
-          <a:blip r:embed="rId5">
-            <a:extLst>
-              <a:ext uri="{28A0092B-C50C-407E-A947-70E740481C1C}">
-                <a14:useLocalDpi xmlns:a14="http://schemas.microsoft.com/office/drawing/2010/main" val="0"/>
-              </a:ext>
-            </a:extLst>
-          </a:blip>
-          <a:stretch>
-            <a:fillRect/>
-          </a:stretch>
-        </p:blipFill>
-        <p:spPr>
-          <a:xfrm>
-            <a:off x="1012116" y="4301998"/>
-            <a:ext cx="3209929" cy="2153327"/>
-          </a:xfrm>
-          <a:prstGeom prst="rect">
-            <a:avLst/>
-          </a:prstGeom>
-        </p:spPr>
-      </p:pic>
-      <p:pic>
-        <p:nvPicPr>
-          <p:cNvPr id="8" name="Picture 7"/>
-          <p:cNvPicPr>
-            <a:picLocks noChangeAspect="1"/>
-          </p:cNvPicPr>
-          <p:nvPr/>
-        </p:nvPicPr>
-        <p:blipFill>
-          <a:blip r:embed="rId6">
-            <a:extLst>
-              <a:ext uri="{28A0092B-C50C-407E-A947-70E740481C1C}">
-                <a14:useLocalDpi xmlns:a14="http://schemas.microsoft.com/office/drawing/2010/main" val="0"/>
-              </a:ext>
-            </a:extLst>
-          </a:blip>
-          <a:stretch>
-            <a:fillRect/>
-          </a:stretch>
-        </p:blipFill>
-        <p:spPr>
-          <a:xfrm>
-            <a:off x="6167070" y="4461727"/>
-            <a:ext cx="2594505" cy="1993598"/>
-          </a:xfrm>
-          <a:prstGeom prst="rect">
-            <a:avLst/>
-          </a:prstGeom>
-        </p:spPr>
-      </p:pic>
+        <p:txBody>
+          <a:bodyPr wrap="none" rtlCol="0">
+            <a:spAutoFit/>
+          </a:bodyPr>
+          <a:lstStyle/>
+          <a:p>
+            <a:pPr algn="ctr"/>
+            <a:r>
+              <a:rPr lang="en-CA" sz="2400" dirty="0"/>
+              <a:t>3) Binarized Image</a:t>
+            </a:r>
+            <a:endParaRPr lang="en-CA" dirty="0"/>
+          </a:p>
+        </p:txBody>
+      </p:sp>
     </p:spTree>
     <p:extLst>
       <p:ext uri="{BB962C8B-B14F-4D97-AF65-F5344CB8AC3E}">
-        <p14:creationId xmlns:p14="http://schemas.microsoft.com/office/powerpoint/2010/main" val="1864993364"/>
+        <p14:creationId xmlns:p14="http://schemas.microsoft.com/office/powerpoint/2010/main" val="2802468919"/>
       </p:ext>
     </p:extLst>
   </p:cSld>
@@ -10734,21 +10915,131 @@
             <p:ph type="title"/>
           </p:nvPr>
         </p:nvSpPr>
+        <p:spPr/>
+        <p:txBody>
+          <a:bodyPr/>
+          <a:lstStyle/>
+          <a:p>
+            <a:r>
+              <a:rPr lang="en-CA" dirty="0"/>
+              <a:t>VC – Image Processing (3)</a:t>
+            </a:r>
+          </a:p>
+        </p:txBody>
+      </p:sp>
+      <p:pic>
+        <p:nvPicPr>
+          <p:cNvPr id="5" name="Content Placeholder 4"/>
+          <p:cNvPicPr>
+            <a:picLocks noGrp="1" noChangeAspect="1"/>
+          </p:cNvPicPr>
+          <p:nvPr>
+            <p:ph idx="1"/>
+          </p:nvPr>
+        </p:nvPicPr>
+        <p:blipFill>
+          <a:blip r:embed="rId3">
+            <a:extLst>
+              <a:ext uri="{28A0092B-C50C-407E-A947-70E740481C1C}">
+                <a14:useLocalDpi xmlns:a14="http://schemas.microsoft.com/office/drawing/2010/main" val="0"/>
+              </a:ext>
+            </a:extLst>
+          </a:blip>
+          <a:stretch>
+            <a:fillRect/>
+          </a:stretch>
+        </p:blipFill>
         <p:spPr>
           <a:xfrm>
-            <a:off x="1465038" y="301105"/>
-            <a:ext cx="10178322" cy="1492132"/>
+            <a:off x="3292475" y="2597150"/>
+            <a:ext cx="6096000" cy="2971800"/>
           </a:xfrm>
         </p:spPr>
+      </p:pic>
+      <p:sp>
+        <p:nvSpPr>
+          <p:cNvPr id="6" name="TextBox 5"/>
+          <p:cNvSpPr txBox="1"/>
+          <p:nvPr/>
+        </p:nvSpPr>
+        <p:spPr>
+          <a:xfrm>
+            <a:off x="5113215" y="2005001"/>
+            <a:ext cx="2454519" cy="461665"/>
+          </a:xfrm>
+          <a:prstGeom prst="rect">
+            <a:avLst/>
+          </a:prstGeom>
+          <a:noFill/>
+        </p:spPr>
+        <p:txBody>
+          <a:bodyPr wrap="none" rtlCol="0">
+            <a:spAutoFit/>
+          </a:bodyPr>
+          <a:lstStyle/>
+          <a:p>
+            <a:pPr algn="ctr"/>
+            <a:r>
+              <a:rPr lang="en-CA" sz="2400" dirty="0"/>
+              <a:t>4) Edge Detection</a:t>
+            </a:r>
+            <a:endParaRPr lang="en-CA" dirty="0"/>
+          </a:p>
+        </p:txBody>
+      </p:sp>
+    </p:spTree>
+    <p:extLst>
+      <p:ext uri="{BB962C8B-B14F-4D97-AF65-F5344CB8AC3E}">
+        <p14:creationId xmlns:p14="http://schemas.microsoft.com/office/powerpoint/2010/main" val="1412961137"/>
+      </p:ext>
+    </p:extLst>
+  </p:cSld>
+  <p:clrMapOvr>
+    <a:masterClrMapping/>
+  </p:clrMapOvr>
+</p:sld>
+</file>
+
+<file path=ppt/slides/slide13.xml><?xml version="1.0" encoding="utf-8"?>
+<p:sld xmlns:a="http://schemas.openxmlformats.org/drawingml/2006/main" xmlns:r="http://schemas.openxmlformats.org/officeDocument/2006/relationships" xmlns:p="http://schemas.openxmlformats.org/presentationml/2006/main">
+  <p:cSld>
+    <p:spTree>
+      <p:nvGrpSpPr>
+        <p:cNvPr id="1" name=""/>
+        <p:cNvGrpSpPr/>
+        <p:nvPr/>
+      </p:nvGrpSpPr>
+      <p:grpSpPr>
+        <a:xfrm>
+          <a:off x="0" y="0"/>
+          <a:ext cx="0" cy="0"/>
+          <a:chOff x="0" y="0"/>
+          <a:chExt cx="0" cy="0"/>
+        </a:xfrm>
+      </p:grpSpPr>
+      <p:sp>
+        <p:nvSpPr>
+          <p:cNvPr id="2" name="Title 1"/>
+          <p:cNvSpPr>
+            <a:spLocks noGrp="1"/>
+          </p:cNvSpPr>
+          <p:nvPr>
+            <p:ph type="title"/>
+          </p:nvPr>
+        </p:nvSpPr>
+        <p:spPr/>
         <p:txBody>
           <a:bodyPr/>
           <a:lstStyle/>
           <a:p>
             <a:r>
-              <a:rPr lang="en-CA" dirty="0" smtClean="0"/>
-              <a:t>VC – Vehicle navigation</a:t>
+              <a:rPr lang="en-US" dirty="0"/>
+              <a:t> VC – Image processing (4)</a:t>
             </a:r>
-            <a:endParaRPr lang="en-US" dirty="0"/>
+            <a:br>
+              <a:rPr lang="en-US" b="1" dirty="0"/>
+            </a:br>
+            <a:endParaRPr lang="en-CA" dirty="0"/>
           </a:p>
         </p:txBody>
       </p:sp>
@@ -10764,6 +11055,210 @@
         </p:nvSpPr>
         <p:spPr>
           <a:xfrm>
+            <a:off x="1014612" y="1874517"/>
+            <a:ext cx="4962855" cy="4005075"/>
+          </a:xfrm>
+        </p:spPr>
+        <p:txBody>
+          <a:bodyPr>
+            <a:noAutofit/>
+          </a:bodyPr>
+          <a:lstStyle/>
+          <a:p>
+            <a:r>
+              <a:rPr lang="en-CA" sz="2800" dirty="0">
+                <a:solidFill>
+                  <a:schemeClr val="tx1"/>
+                </a:solidFill>
+              </a:rPr>
+              <a:t>Binarization</a:t>
+            </a:r>
+          </a:p>
+          <a:p>
+            <a:r>
+              <a:rPr lang="en-CA" sz="2800" dirty="0">
+                <a:solidFill>
+                  <a:schemeClr val="tx1"/>
+                </a:solidFill>
+              </a:rPr>
+              <a:t>Canny Edge Detection</a:t>
+            </a:r>
+          </a:p>
+          <a:p>
+            <a:r>
+              <a:rPr lang="en-CA" sz="2800" dirty="0">
+                <a:solidFill>
+                  <a:schemeClr val="tx1"/>
+                </a:solidFill>
+              </a:rPr>
+              <a:t>Probabilistic Hough Line Transform</a:t>
+            </a:r>
+          </a:p>
+          <a:p>
+            <a:pPr lvl="1"/>
+            <a:r>
+              <a:rPr lang="en-CA" sz="2800" dirty="0">
+                <a:solidFill>
+                  <a:schemeClr val="tx1"/>
+                </a:solidFill>
+              </a:rPr>
+              <a:t>Average line angle</a:t>
+            </a:r>
+          </a:p>
+          <a:p>
+            <a:pPr lvl="1"/>
+            <a:r>
+              <a:rPr lang="en-CA" sz="2800" dirty="0">
+                <a:solidFill>
+                  <a:schemeClr val="tx1"/>
+                </a:solidFill>
+              </a:rPr>
+              <a:t>Average left and right distance</a:t>
+            </a:r>
+          </a:p>
+          <a:p>
+            <a:r>
+              <a:rPr lang="en-CA" sz="2800" dirty="0">
+                <a:solidFill>
+                  <a:schemeClr val="tx1"/>
+                </a:solidFill>
+              </a:rPr>
+              <a:t>Intersection detection</a:t>
+            </a:r>
+          </a:p>
+        </p:txBody>
+      </p:sp>
+      <p:pic>
+        <p:nvPicPr>
+          <p:cNvPr id="5" name="Picture 4"/>
+          <p:cNvPicPr>
+            <a:picLocks noChangeAspect="1"/>
+          </p:cNvPicPr>
+          <p:nvPr/>
+        </p:nvPicPr>
+        <p:blipFill>
+          <a:blip r:embed="rId3">
+            <a:extLst>
+              <a:ext uri="{28A0092B-C50C-407E-A947-70E740481C1C}">
+                <a14:useLocalDpi xmlns:a14="http://schemas.microsoft.com/office/drawing/2010/main" val="0"/>
+              </a:ext>
+            </a:extLst>
+          </a:blip>
+          <a:stretch>
+            <a:fillRect/>
+          </a:stretch>
+        </p:blipFill>
+        <p:spPr>
+          <a:xfrm>
+            <a:off x="5571066" y="1880749"/>
+            <a:ext cx="6096000" cy="2971800"/>
+          </a:xfrm>
+          <a:prstGeom prst="rect">
+            <a:avLst/>
+          </a:prstGeom>
+        </p:spPr>
+      </p:pic>
+      <p:sp>
+        <p:nvSpPr>
+          <p:cNvPr id="6" name="TextBox 5"/>
+          <p:cNvSpPr txBox="1"/>
+          <p:nvPr/>
+        </p:nvSpPr>
+        <p:spPr>
+          <a:xfrm>
+            <a:off x="7391807" y="4904405"/>
+            <a:ext cx="2121093" cy="461665"/>
+          </a:xfrm>
+          <a:prstGeom prst="rect">
+            <a:avLst/>
+          </a:prstGeom>
+          <a:noFill/>
+        </p:spPr>
+        <p:txBody>
+          <a:bodyPr wrap="none" rtlCol="0">
+            <a:spAutoFit/>
+          </a:bodyPr>
+          <a:lstStyle/>
+          <a:p>
+            <a:pPr algn="ctr"/>
+            <a:r>
+              <a:rPr lang="en-CA" sz="2400" dirty="0"/>
+              <a:t>5) Finding Lines</a:t>
+            </a:r>
+            <a:endParaRPr lang="en-CA" dirty="0"/>
+          </a:p>
+        </p:txBody>
+      </p:sp>
+    </p:spTree>
+    <p:extLst>
+      <p:ext uri="{BB962C8B-B14F-4D97-AF65-F5344CB8AC3E}">
+        <p14:creationId xmlns:p14="http://schemas.microsoft.com/office/powerpoint/2010/main" val="2985287176"/>
+      </p:ext>
+    </p:extLst>
+  </p:cSld>
+  <p:clrMapOvr>
+    <a:masterClrMapping/>
+  </p:clrMapOvr>
+</p:sld>
+</file>
+
+<file path=ppt/slides/slide14.xml><?xml version="1.0" encoding="utf-8"?>
+<p:sld xmlns:a="http://schemas.openxmlformats.org/drawingml/2006/main" xmlns:r="http://schemas.openxmlformats.org/officeDocument/2006/relationships" xmlns:p="http://schemas.openxmlformats.org/presentationml/2006/main">
+  <p:cSld>
+    <p:spTree>
+      <p:nvGrpSpPr>
+        <p:cNvPr id="1" name=""/>
+        <p:cNvGrpSpPr/>
+        <p:nvPr/>
+      </p:nvGrpSpPr>
+      <p:grpSpPr>
+        <a:xfrm>
+          <a:off x="0" y="0"/>
+          <a:ext cx="0" cy="0"/>
+          <a:chOff x="0" y="0"/>
+          <a:chExt cx="0" cy="0"/>
+        </a:xfrm>
+      </p:grpSpPr>
+      <p:sp>
+        <p:nvSpPr>
+          <p:cNvPr id="2" name="Title 1"/>
+          <p:cNvSpPr>
+            <a:spLocks noGrp="1"/>
+          </p:cNvSpPr>
+          <p:nvPr>
+            <p:ph type="title"/>
+          </p:nvPr>
+        </p:nvSpPr>
+        <p:spPr>
+          <a:xfrm>
+            <a:off x="1465038" y="301105"/>
+            <a:ext cx="10178322" cy="1492132"/>
+          </a:xfrm>
+        </p:spPr>
+        <p:txBody>
+          <a:bodyPr/>
+          <a:lstStyle/>
+          <a:p>
+            <a:r>
+              <a:rPr lang="en-CA" dirty="0"/>
+              <a:t>VC – Vehicle navigation</a:t>
+            </a:r>
+            <a:endParaRPr lang="en-US" dirty="0"/>
+          </a:p>
+        </p:txBody>
+      </p:sp>
+      <p:sp>
+        <p:nvSpPr>
+          <p:cNvPr id="3" name="Content Placeholder 2"/>
+          <p:cNvSpPr>
+            <a:spLocks noGrp="1"/>
+          </p:cNvSpPr>
+          <p:nvPr>
+            <p:ph idx="1"/>
+          </p:nvPr>
+        </p:nvSpPr>
+        <p:spPr>
+          <a:xfrm>
             <a:off x="1271998" y="1259841"/>
             <a:ext cx="10178322" cy="2296159"/>
           </a:xfrm>
@@ -10777,7 +11272,7 @@
             <a:pPr marL="0" indent="0">
               <a:buNone/>
             </a:pPr>
-            <a:endParaRPr lang="en-US" sz="1800" b="1" dirty="0" smtClean="0"/>
+            <a:endParaRPr lang="en-US" sz="1800" b="1" dirty="0"/>
           </a:p>
           <a:p>
             <a:pPr marL="0" indent="0">
@@ -11028,23 +11523,18 @@
           </a:lstStyle>
           <a:p>
             <a:r>
-              <a:rPr lang="en-CA" sz="2800" dirty="0" smtClean="0">
+              <a:rPr lang="en-CA" sz="2800" dirty="0">
                 <a:solidFill>
                   <a:schemeClr val="tx1"/>
                 </a:solidFill>
               </a:rPr>
               <a:t>Controls wheel angle</a:t>
             </a:r>
-            <a:endParaRPr lang="en-CA" sz="2800" dirty="0">
-              <a:solidFill>
-                <a:schemeClr val="tx1"/>
-              </a:solidFill>
-            </a:endParaRPr>
           </a:p>
           <a:p>
             <a:pPr lvl="1"/>
             <a:r>
-              <a:rPr lang="en-CA" sz="2600" dirty="0" smtClean="0">
+              <a:rPr lang="en-CA" sz="2800" dirty="0">
                 <a:solidFill>
                   <a:schemeClr val="tx1"/>
                 </a:solidFill>
@@ -11055,7 +11545,7 @@
           <a:p>
             <a:pPr lvl="2"/>
             <a:r>
-              <a:rPr lang="en-CA" sz="2400" dirty="0" smtClean="0">
+              <a:rPr lang="en-CA" sz="2800" dirty="0">
                 <a:solidFill>
                   <a:schemeClr val="tx1"/>
                 </a:solidFill>
@@ -11066,7 +11556,7 @@
           <a:p>
             <a:pPr lvl="2"/>
             <a:r>
-              <a:rPr lang="en-CA" sz="2400" dirty="0" smtClean="0">
+              <a:rPr lang="en-CA" sz="2800" dirty="0">
                 <a:solidFill>
                   <a:schemeClr val="tx1"/>
                 </a:solidFill>
@@ -11076,21 +11566,16 @@
           </a:p>
           <a:p>
             <a:r>
-              <a:rPr lang="en-CA" sz="3000" dirty="0" smtClean="0">
+              <a:rPr lang="en-CA" sz="2800" dirty="0">
                 <a:solidFill>
                   <a:schemeClr val="tx1"/>
                 </a:solidFill>
               </a:rPr>
               <a:t>Sets speed</a:t>
             </a:r>
-            <a:endParaRPr lang="en-CA" sz="3000" dirty="0">
-              <a:solidFill>
-                <a:schemeClr val="tx1"/>
-              </a:solidFill>
-            </a:endParaRPr>
-          </a:p>
-          <a:p>
-            <a:endParaRPr lang="en-CA" sz="2800" dirty="0" smtClean="0"/>
+          </a:p>
+          <a:p>
+            <a:endParaRPr lang="en-CA" sz="2800" dirty="0"/>
           </a:p>
         </p:txBody>
       </p:sp>
@@ -11116,8 +11601,8 @@
         </p:blipFill>
         <p:spPr>
           <a:xfrm>
-            <a:off x="6340839" y="1723259"/>
-            <a:ext cx="4877223" cy="3657917"/>
+            <a:off x="6340839" y="2363394"/>
+            <a:ext cx="4877223" cy="2377646"/>
           </a:xfrm>
           <a:prstGeom prst="rect">
             <a:avLst/>
@@ -11128,185 +11613,6 @@
     <p:extLst>
       <p:ext uri="{BB962C8B-B14F-4D97-AF65-F5344CB8AC3E}">
         <p14:creationId xmlns:p14="http://schemas.microsoft.com/office/powerpoint/2010/main" val="3940846537"/>
-      </p:ext>
-    </p:extLst>
-  </p:cSld>
-  <p:clrMapOvr>
-    <a:masterClrMapping/>
-  </p:clrMapOvr>
-  <p:timing>
-    <p:tnLst>
-      <p:par>
-        <p:cTn id="1" dur="indefinite" restart="never" nodeType="tmRoot"/>
-      </p:par>
-    </p:tnLst>
-  </p:timing>
-</p:sld>
-</file>
-
-<file path=ppt/slides/slide13.xml><?xml version="1.0" encoding="utf-8"?>
-<p:sld xmlns:a="http://schemas.openxmlformats.org/drawingml/2006/main" xmlns:r="http://schemas.openxmlformats.org/officeDocument/2006/relationships" xmlns:p="http://schemas.openxmlformats.org/presentationml/2006/main">
-  <p:cSld>
-    <p:spTree>
-      <p:nvGrpSpPr>
-        <p:cNvPr id="1" name=""/>
-        <p:cNvGrpSpPr/>
-        <p:nvPr/>
-      </p:nvGrpSpPr>
-      <p:grpSpPr>
-        <a:xfrm>
-          <a:off x="0" y="0"/>
-          <a:ext cx="0" cy="0"/>
-          <a:chOff x="0" y="0"/>
-          <a:chExt cx="0" cy="0"/>
-        </a:xfrm>
-      </p:grpSpPr>
-      <p:sp>
-        <p:nvSpPr>
-          <p:cNvPr id="2" name="Title 1"/>
-          <p:cNvSpPr>
-            <a:spLocks noGrp="1"/>
-          </p:cNvSpPr>
-          <p:nvPr>
-            <p:ph type="title"/>
-          </p:nvPr>
-        </p:nvSpPr>
-        <p:spPr/>
-        <p:txBody>
-          <a:bodyPr/>
-          <a:lstStyle/>
-          <a:p>
-            <a:r>
-              <a:rPr lang="en-CA" dirty="0"/>
-              <a:t>Video of car driving</a:t>
-            </a:r>
-            <a:endParaRPr lang="en-US" dirty="0"/>
-          </a:p>
-        </p:txBody>
-      </p:sp>
-      <p:sp>
-        <p:nvSpPr>
-          <p:cNvPr id="3" name="Content Placeholder 2"/>
-          <p:cNvSpPr>
-            <a:spLocks noGrp="1"/>
-          </p:cNvSpPr>
-          <p:nvPr>
-            <p:ph idx="1"/>
-          </p:nvPr>
-        </p:nvSpPr>
-        <p:spPr/>
-        <p:txBody>
-          <a:bodyPr/>
-          <a:lstStyle/>
-          <a:p>
-            <a:endParaRPr lang="en-US" dirty="0"/>
-          </a:p>
-        </p:txBody>
-      </p:sp>
-    </p:spTree>
-    <p:extLst>
-      <p:ext uri="{BB962C8B-B14F-4D97-AF65-F5344CB8AC3E}">
-        <p14:creationId xmlns:p14="http://schemas.microsoft.com/office/powerpoint/2010/main" val="1157409652"/>
-      </p:ext>
-    </p:extLst>
-  </p:cSld>
-  <p:clrMapOvr>
-    <a:masterClrMapping/>
-  </p:clrMapOvr>
-</p:sld>
-</file>
-
-<file path=ppt/slides/slide14.xml><?xml version="1.0" encoding="utf-8"?>
-<p:sld xmlns:a="http://schemas.openxmlformats.org/drawingml/2006/main" xmlns:r="http://schemas.openxmlformats.org/officeDocument/2006/relationships" xmlns:p="http://schemas.openxmlformats.org/presentationml/2006/main">
-  <p:cSld>
-    <p:spTree>
-      <p:nvGrpSpPr>
-        <p:cNvPr id="1" name=""/>
-        <p:cNvGrpSpPr/>
-        <p:nvPr/>
-      </p:nvGrpSpPr>
-      <p:grpSpPr>
-        <a:xfrm>
-          <a:off x="0" y="0"/>
-          <a:ext cx="0" cy="0"/>
-          <a:chOff x="0" y="0"/>
-          <a:chExt cx="0" cy="0"/>
-        </a:xfrm>
-      </p:grpSpPr>
-      <p:sp>
-        <p:nvSpPr>
-          <p:cNvPr id="2" name="Title 1"/>
-          <p:cNvSpPr>
-            <a:spLocks noGrp="1"/>
-          </p:cNvSpPr>
-          <p:nvPr>
-            <p:ph type="title"/>
-          </p:nvPr>
-        </p:nvSpPr>
-        <p:spPr/>
-        <p:txBody>
-          <a:bodyPr/>
-          <a:lstStyle/>
-          <a:p>
-            <a:r>
-              <a:rPr lang="en-CA" dirty="0"/>
-              <a:t>Hazard mitigation</a:t>
-            </a:r>
-            <a:endParaRPr lang="en-US" dirty="0"/>
-          </a:p>
-        </p:txBody>
-      </p:sp>
-      <p:sp>
-        <p:nvSpPr>
-          <p:cNvPr id="3" name="Content Placeholder 2"/>
-          <p:cNvSpPr>
-            <a:spLocks noGrp="1"/>
-          </p:cNvSpPr>
-          <p:nvPr>
-            <p:ph idx="1"/>
-          </p:nvPr>
-        </p:nvSpPr>
-        <p:spPr>
-          <a:xfrm>
-            <a:off x="1099278" y="2057401"/>
-            <a:ext cx="10178322" cy="3593591"/>
-          </a:xfrm>
-        </p:spPr>
-        <p:txBody>
-          <a:bodyPr>
-            <a:noAutofit/>
-          </a:bodyPr>
-          <a:lstStyle/>
-          <a:p>
-            <a:pPr marL="457200" lvl="1" indent="0">
-              <a:buNone/>
-            </a:pPr>
-            <a:endParaRPr lang="en-CA" sz="2400" dirty="0" smtClean="0"/>
-          </a:p>
-          <a:p>
-            <a:r>
-              <a:rPr lang="en-CA" sz="3200" dirty="0" smtClean="0"/>
-              <a:t>Communication</a:t>
-            </a:r>
-          </a:p>
-          <a:p>
-            <a:r>
-              <a:rPr lang="en-CA" sz="3200" dirty="0" smtClean="0"/>
-              <a:t>Loss of power</a:t>
-            </a:r>
-          </a:p>
-          <a:p>
-            <a:r>
-              <a:rPr lang="en-CA" sz="3200" dirty="0" smtClean="0"/>
-              <a:t>Software (crashes and errors)	</a:t>
-            </a:r>
-          </a:p>
-        </p:txBody>
-      </p:sp>
-    </p:spTree>
-    <p:extLst>
-      <p:ext uri="{BB962C8B-B14F-4D97-AF65-F5344CB8AC3E}">
-        <p14:creationId xmlns:p14="http://schemas.microsoft.com/office/powerpoint/2010/main" val="3982056765"/>
       </p:ext>
     </p:extLst>
   </p:cSld>
@@ -11345,22 +11651,19 @@
         </p:nvSpPr>
         <p:spPr/>
         <p:txBody>
-          <a:bodyPr/>
+          <a:bodyPr>
+            <a:noAutofit/>
+          </a:bodyPr>
           <a:lstStyle/>
           <a:p>
             <a:r>
-              <a:rPr lang="en-CA" dirty="0"/>
-              <a:t>Features </a:t>
+              <a:rPr lang="en-US" dirty="0"/>
+              <a:t>VC – Hardware Interfacing </a:t>
             </a:r>
-            <a:r>
-              <a:rPr lang="en-CA" dirty="0" smtClean="0"/>
-              <a:t>to </a:t>
-            </a:r>
-            <a:r>
-              <a:rPr lang="en-CA" dirty="0"/>
-              <a:t>be implemented</a:t>
-            </a:r>
-            <a:endParaRPr lang="en-US" dirty="0"/>
+            <a:br>
+              <a:rPr lang="en-US" b="1" dirty="0"/>
+            </a:br>
+            <a:endParaRPr lang="en-CA" dirty="0"/>
           </a:p>
         </p:txBody>
       </p:sp>
@@ -11374,7 +11677,12 @@
             <p:ph idx="1"/>
           </p:nvPr>
         </p:nvSpPr>
-        <p:spPr/>
+        <p:spPr>
+          <a:xfrm>
+            <a:off x="1251678" y="1755423"/>
+            <a:ext cx="10178322" cy="3593591"/>
+          </a:xfrm>
+        </p:spPr>
         <p:txBody>
           <a:bodyPr>
             <a:normAutofit/>
@@ -11382,32 +11690,218 @@
           <a:lstStyle/>
           <a:p>
             <a:r>
-              <a:rPr lang="en-CA" sz="3200" dirty="0"/>
-              <a:t>Bluetooth to other communication</a:t>
+              <a:rPr lang="en-CA" sz="2800" dirty="0">
+                <a:solidFill>
+                  <a:schemeClr val="tx1"/>
+                </a:solidFill>
+              </a:rPr>
+              <a:t>Raspberry Pi 3</a:t>
             </a:r>
           </a:p>
           <a:p>
             <a:r>
-              <a:rPr lang="en-CA" sz="3200" dirty="0"/>
-              <a:t>IC vehicle detection</a:t>
+              <a:rPr lang="en-CA" sz="2800" dirty="0">
+                <a:solidFill>
+                  <a:schemeClr val="tx1"/>
+                </a:solidFill>
+              </a:rPr>
+              <a:t>Servo </a:t>
             </a:r>
           </a:p>
           <a:p>
             <a:r>
-              <a:rPr lang="en-CA" sz="3200" dirty="0"/>
-              <a:t>Obstacle </a:t>
+              <a:rPr lang="en-CA" sz="2800" dirty="0">
+                <a:solidFill>
+                  <a:schemeClr val="tx1"/>
+                </a:solidFill>
+              </a:rPr>
+              <a:t>Speed Controller</a:t>
             </a:r>
+          </a:p>
+          <a:p>
             <a:r>
-              <a:rPr lang="en-CA" sz="3200" dirty="0" smtClean="0"/>
-              <a:t>detection??????????????????</a:t>
+              <a:rPr lang="en-CA" sz="2800" dirty="0">
+                <a:solidFill>
+                  <a:schemeClr val="tx1"/>
+                </a:solidFill>
+              </a:rPr>
+              <a:t>Ultrasonic Sensor (HC-SR04)</a:t>
             </a:r>
           </a:p>
         </p:txBody>
       </p:sp>
+      <p:sp>
+        <p:nvSpPr>
+          <p:cNvPr id="9" name="Rounded Rectangle 8"/>
+          <p:cNvSpPr/>
+          <p:nvPr/>
+        </p:nvSpPr>
+        <p:spPr>
+          <a:xfrm>
+            <a:off x="927817" y="4095946"/>
+            <a:ext cx="10826044" cy="2506133"/>
+          </a:xfrm>
+          <a:prstGeom prst="roundRect">
+            <a:avLst/>
+          </a:prstGeom>
+          <a:solidFill>
+            <a:schemeClr val="bg1"/>
+          </a:solidFill>
+          <a:ln>
+            <a:solidFill>
+              <a:schemeClr val="tx1"/>
+            </a:solidFill>
+          </a:ln>
+        </p:spPr>
+        <p:style>
+          <a:lnRef idx="2">
+            <a:schemeClr val="accent1">
+              <a:shade val="50000"/>
+            </a:schemeClr>
+          </a:lnRef>
+          <a:fillRef idx="1">
+            <a:schemeClr val="accent1"/>
+          </a:fillRef>
+          <a:effectRef idx="0">
+            <a:schemeClr val="accent1"/>
+          </a:effectRef>
+          <a:fontRef idx="minor">
+            <a:schemeClr val="lt1"/>
+          </a:fontRef>
+        </p:style>
+        <p:txBody>
+          <a:bodyPr rtlCol="0" anchor="ctr"/>
+          <a:lstStyle/>
+          <a:p>
+            <a:pPr algn="ctr"/>
+            <a:endParaRPr lang="en-CA" dirty="0"/>
+          </a:p>
+        </p:txBody>
+      </p:sp>
+      <p:pic>
+        <p:nvPicPr>
+          <p:cNvPr id="4" name="Picture 3"/>
+          <p:cNvPicPr>
+            <a:picLocks noChangeAspect="1"/>
+          </p:cNvPicPr>
+          <p:nvPr/>
+        </p:nvPicPr>
+        <p:blipFill>
+          <a:blip r:embed="rId3">
+            <a:extLst>
+              <a:ext uri="{28A0092B-C50C-407E-A947-70E740481C1C}">
+                <a14:useLocalDpi xmlns:a14="http://schemas.microsoft.com/office/drawing/2010/main" val="0"/>
+              </a:ext>
+            </a:extLst>
+          </a:blip>
+          <a:stretch>
+            <a:fillRect/>
+          </a:stretch>
+        </p:blipFill>
+        <p:spPr>
+          <a:xfrm>
+            <a:off x="9028112" y="4700939"/>
+            <a:ext cx="2548644" cy="1515173"/>
+          </a:xfrm>
+          <a:prstGeom prst="rect">
+            <a:avLst/>
+          </a:prstGeom>
+        </p:spPr>
+      </p:pic>
+      <p:pic>
+        <p:nvPicPr>
+          <p:cNvPr id="5" name="Picture 4"/>
+          <p:cNvPicPr>
+            <a:picLocks noChangeAspect="1"/>
+          </p:cNvPicPr>
+          <p:nvPr/>
+        </p:nvPicPr>
+        <p:blipFill>
+          <a:blip r:embed="rId4">
+            <a:extLst>
+              <a:ext uri="{28A0092B-C50C-407E-A947-70E740481C1C}">
+                <a14:useLocalDpi xmlns:a14="http://schemas.microsoft.com/office/drawing/2010/main" val="0"/>
+              </a:ext>
+            </a:extLst>
+          </a:blip>
+          <a:stretch>
+            <a:fillRect/>
+          </a:stretch>
+        </p:blipFill>
+        <p:spPr>
+          <a:xfrm>
+            <a:off x="4039671" y="4576844"/>
+            <a:ext cx="2301168" cy="1544339"/>
+          </a:xfrm>
+          <a:prstGeom prst="rect">
+            <a:avLst/>
+          </a:prstGeom>
+        </p:spPr>
+      </p:pic>
+      <p:pic>
+        <p:nvPicPr>
+          <p:cNvPr id="7" name="Picture 6"/>
+          <p:cNvPicPr>
+            <a:picLocks noChangeAspect="1"/>
+          </p:cNvPicPr>
+          <p:nvPr/>
+        </p:nvPicPr>
+        <p:blipFill>
+          <a:blip r:embed="rId5">
+            <a:extLst>
+              <a:ext uri="{28A0092B-C50C-407E-A947-70E740481C1C}">
+                <a14:useLocalDpi xmlns:a14="http://schemas.microsoft.com/office/drawing/2010/main" val="0"/>
+              </a:ext>
+            </a:extLst>
+          </a:blip>
+          <a:stretch>
+            <a:fillRect/>
+          </a:stretch>
+        </p:blipFill>
+        <p:spPr>
+          <a:xfrm>
+            <a:off x="1012116" y="4301998"/>
+            <a:ext cx="3209929" cy="2153327"/>
+          </a:xfrm>
+          <a:prstGeom prst="rect">
+            <a:avLst/>
+          </a:prstGeom>
+        </p:spPr>
+      </p:pic>
+      <p:pic>
+        <p:nvPicPr>
+          <p:cNvPr id="8" name="Picture 7"/>
+          <p:cNvPicPr>
+            <a:picLocks noChangeAspect="1"/>
+          </p:cNvPicPr>
+          <p:nvPr/>
+        </p:nvPicPr>
+        <p:blipFill>
+          <a:blip r:embed="rId6">
+            <a:extLst>
+              <a:ext uri="{28A0092B-C50C-407E-A947-70E740481C1C}">
+                <a14:useLocalDpi xmlns:a14="http://schemas.microsoft.com/office/drawing/2010/main" val="0"/>
+              </a:ext>
+            </a:extLst>
+          </a:blip>
+          <a:stretch>
+            <a:fillRect/>
+          </a:stretch>
+        </p:blipFill>
+        <p:spPr>
+          <a:xfrm>
+            <a:off x="6167070" y="4461727"/>
+            <a:ext cx="2594505" cy="1993598"/>
+          </a:xfrm>
+          <a:prstGeom prst="rect">
+            <a:avLst/>
+          </a:prstGeom>
+        </p:spPr>
+      </p:pic>
     </p:spTree>
     <p:extLst>
       <p:ext uri="{BB962C8B-B14F-4D97-AF65-F5344CB8AC3E}">
-        <p14:creationId xmlns:p14="http://schemas.microsoft.com/office/powerpoint/2010/main" val="3886893300"/>
+        <p14:creationId xmlns:p14="http://schemas.microsoft.com/office/powerpoint/2010/main" val="1864993364"/>
       </p:ext>
     </p:extLst>
   </p:cSld>
@@ -11444,31 +11938,42 @@
             <p:ph type="title"/>
           </p:nvPr>
         </p:nvSpPr>
-        <p:spPr>
-          <a:xfrm>
-            <a:off x="1088393" y="2352698"/>
-            <a:ext cx="10178322" cy="1492132"/>
-          </a:xfrm>
-        </p:spPr>
-        <p:txBody>
-          <a:bodyPr>
-            <a:normAutofit/>
-          </a:bodyPr>
+        <p:spPr/>
+        <p:txBody>
+          <a:bodyPr/>
           <a:lstStyle/>
           <a:p>
-            <a:pPr algn="ctr"/>
             <a:r>
-              <a:rPr lang="en-CA" sz="8000" dirty="0" err="1" smtClean="0"/>
-              <a:t>DEmo</a:t>
+              <a:rPr lang="en-CA" dirty="0"/>
+              <a:t>Video of car driving</a:t>
             </a:r>
-            <a:endParaRPr lang="en-CA" sz="8000" dirty="0"/>
+            <a:endParaRPr lang="en-US" dirty="0"/>
+          </a:p>
+        </p:txBody>
+      </p:sp>
+      <p:sp>
+        <p:nvSpPr>
+          <p:cNvPr id="3" name="Content Placeholder 2"/>
+          <p:cNvSpPr>
+            <a:spLocks noGrp="1"/>
+          </p:cNvSpPr>
+          <p:nvPr>
+            <p:ph idx="1"/>
+          </p:nvPr>
+        </p:nvSpPr>
+        <p:spPr/>
+        <p:txBody>
+          <a:bodyPr/>
+          <a:lstStyle/>
+          <a:p>
+            <a:endParaRPr lang="en-US" dirty="0"/>
           </a:p>
         </p:txBody>
       </p:sp>
     </p:spTree>
     <p:extLst>
       <p:ext uri="{BB962C8B-B14F-4D97-AF65-F5344CB8AC3E}">
-        <p14:creationId xmlns:p14="http://schemas.microsoft.com/office/powerpoint/2010/main" val="3384724540"/>
+        <p14:creationId xmlns:p14="http://schemas.microsoft.com/office/powerpoint/2010/main" val="1157409652"/>
       </p:ext>
     </p:extLst>
   </p:cSld>
@@ -11497,6 +12002,1461 @@
       </p:grpSpPr>
       <p:sp>
         <p:nvSpPr>
+          <p:cNvPr id="2" name="Title 1"/>
+          <p:cNvSpPr>
+            <a:spLocks noGrp="1"/>
+          </p:cNvSpPr>
+          <p:nvPr>
+            <p:ph type="title"/>
+          </p:nvPr>
+        </p:nvSpPr>
+        <p:spPr/>
+        <p:txBody>
+          <a:bodyPr/>
+          <a:lstStyle/>
+          <a:p>
+            <a:r>
+              <a:rPr lang="en-CA" dirty="0"/>
+              <a:t>Hazard mitigation</a:t>
+            </a:r>
+            <a:endParaRPr lang="en-US" dirty="0"/>
+          </a:p>
+        </p:txBody>
+      </p:sp>
+      <p:sp>
+        <p:nvSpPr>
+          <p:cNvPr id="3" name="Content Placeholder 2"/>
+          <p:cNvSpPr>
+            <a:spLocks noGrp="1"/>
+          </p:cNvSpPr>
+          <p:nvPr>
+            <p:ph idx="1"/>
+          </p:nvPr>
+        </p:nvSpPr>
+        <p:spPr>
+          <a:xfrm>
+            <a:off x="1099278" y="2057401"/>
+            <a:ext cx="10178322" cy="3593591"/>
+          </a:xfrm>
+        </p:spPr>
+        <p:txBody>
+          <a:bodyPr>
+            <a:noAutofit/>
+          </a:bodyPr>
+          <a:lstStyle/>
+          <a:p>
+            <a:pPr marL="457200" lvl="1" indent="0">
+              <a:buNone/>
+            </a:pPr>
+            <a:endParaRPr lang="en-CA" sz="2400" dirty="0">
+              <a:solidFill>
+                <a:schemeClr val="tx1"/>
+              </a:solidFill>
+            </a:endParaRPr>
+          </a:p>
+          <a:p>
+            <a:r>
+              <a:rPr lang="en-CA" sz="3200" dirty="0">
+                <a:solidFill>
+                  <a:schemeClr val="tx1"/>
+                </a:solidFill>
+              </a:rPr>
+              <a:t>Communication</a:t>
+            </a:r>
+          </a:p>
+          <a:p>
+            <a:r>
+              <a:rPr lang="en-CA" sz="3200" dirty="0">
+                <a:solidFill>
+                  <a:schemeClr val="tx1"/>
+                </a:solidFill>
+              </a:rPr>
+              <a:t>Loss of power</a:t>
+            </a:r>
+          </a:p>
+          <a:p>
+            <a:r>
+              <a:rPr lang="en-CA" sz="3200" dirty="0">
+                <a:solidFill>
+                  <a:schemeClr val="tx1"/>
+                </a:solidFill>
+              </a:rPr>
+              <a:t>Software (crashes and errors)	</a:t>
+            </a:r>
+          </a:p>
+        </p:txBody>
+      </p:sp>
+    </p:spTree>
+    <p:extLst>
+      <p:ext uri="{BB962C8B-B14F-4D97-AF65-F5344CB8AC3E}">
+        <p14:creationId xmlns:p14="http://schemas.microsoft.com/office/powerpoint/2010/main" val="3982056765"/>
+      </p:ext>
+    </p:extLst>
+  </p:cSld>
+  <p:clrMapOvr>
+    <a:masterClrMapping/>
+  </p:clrMapOvr>
+</p:sld>
+</file>
+
+<file path=ppt/slides/slide18.xml><?xml version="1.0" encoding="utf-8"?>
+<p:sld xmlns:a="http://schemas.openxmlformats.org/drawingml/2006/main" xmlns:r="http://schemas.openxmlformats.org/officeDocument/2006/relationships" xmlns:p="http://schemas.openxmlformats.org/presentationml/2006/main">
+  <p:cSld>
+    <p:spTree>
+      <p:nvGrpSpPr>
+        <p:cNvPr id="1" name=""/>
+        <p:cNvGrpSpPr/>
+        <p:nvPr/>
+      </p:nvGrpSpPr>
+      <p:grpSpPr>
+        <a:xfrm>
+          <a:off x="0" y="0"/>
+          <a:ext cx="0" cy="0"/>
+          <a:chOff x="0" y="0"/>
+          <a:chExt cx="0" cy="0"/>
+        </a:xfrm>
+      </p:grpSpPr>
+      <p:sp>
+        <p:nvSpPr>
+          <p:cNvPr id="2" name="Title 1"/>
+          <p:cNvSpPr>
+            <a:spLocks noGrp="1"/>
+          </p:cNvSpPr>
+          <p:nvPr>
+            <p:ph type="title"/>
+          </p:nvPr>
+        </p:nvSpPr>
+        <p:spPr/>
+        <p:txBody>
+          <a:bodyPr/>
+          <a:lstStyle/>
+          <a:p>
+            <a:r>
+              <a:rPr lang="en-CA" dirty="0"/>
+              <a:t>Features to be implemented</a:t>
+            </a:r>
+            <a:endParaRPr lang="en-US" dirty="0"/>
+          </a:p>
+        </p:txBody>
+      </p:sp>
+      <p:sp>
+        <p:nvSpPr>
+          <p:cNvPr id="3" name="Content Placeholder 2"/>
+          <p:cNvSpPr>
+            <a:spLocks noGrp="1"/>
+          </p:cNvSpPr>
+          <p:nvPr>
+            <p:ph idx="1"/>
+          </p:nvPr>
+        </p:nvSpPr>
+        <p:spPr/>
+        <p:txBody>
+          <a:bodyPr>
+            <a:normAutofit/>
+          </a:bodyPr>
+          <a:lstStyle/>
+          <a:p>
+            <a:r>
+              <a:rPr lang="en-CA" sz="3200" dirty="0">
+                <a:solidFill>
+                  <a:schemeClr val="tx1"/>
+                </a:solidFill>
+              </a:rPr>
+              <a:t>Bluetooth to other communication</a:t>
+            </a:r>
+          </a:p>
+          <a:p>
+            <a:r>
+              <a:rPr lang="en-CA" sz="3200" dirty="0">
+                <a:solidFill>
+                  <a:schemeClr val="tx1"/>
+                </a:solidFill>
+              </a:rPr>
+              <a:t>IC vehicle detection</a:t>
+            </a:r>
+          </a:p>
+          <a:p>
+            <a:r>
+              <a:rPr lang="en-CA" sz="3200" dirty="0">
+                <a:solidFill>
+                  <a:schemeClr val="tx1"/>
+                </a:solidFill>
+              </a:rPr>
+              <a:t>Obstacle detection??????????????????</a:t>
+            </a:r>
+          </a:p>
+        </p:txBody>
+      </p:sp>
+    </p:spTree>
+    <p:extLst>
+      <p:ext uri="{BB962C8B-B14F-4D97-AF65-F5344CB8AC3E}">
+        <p14:creationId xmlns:p14="http://schemas.microsoft.com/office/powerpoint/2010/main" val="3886893300"/>
+      </p:ext>
+    </p:extLst>
+  </p:cSld>
+  <p:clrMapOvr>
+    <a:masterClrMapping/>
+  </p:clrMapOvr>
+</p:sld>
+</file>
+
+<file path=ppt/slides/slide19.xml><?xml version="1.0" encoding="utf-8"?>
+<p:sld xmlns:a="http://schemas.openxmlformats.org/drawingml/2006/main" xmlns:r="http://schemas.openxmlformats.org/officeDocument/2006/relationships" xmlns:p="http://schemas.openxmlformats.org/presentationml/2006/main">
+  <p:cSld>
+    <p:spTree>
+      <p:nvGrpSpPr>
+        <p:cNvPr id="1" name=""/>
+        <p:cNvGrpSpPr/>
+        <p:nvPr/>
+      </p:nvGrpSpPr>
+      <p:grpSpPr>
+        <a:xfrm>
+          <a:off x="0" y="0"/>
+          <a:ext cx="0" cy="0"/>
+          <a:chOff x="0" y="0"/>
+          <a:chExt cx="0" cy="0"/>
+        </a:xfrm>
+      </p:grpSpPr>
+      <p:sp>
+        <p:nvSpPr>
+          <p:cNvPr id="2" name="Title 1"/>
+          <p:cNvSpPr>
+            <a:spLocks noGrp="1"/>
+          </p:cNvSpPr>
+          <p:nvPr>
+            <p:ph type="title"/>
+          </p:nvPr>
+        </p:nvSpPr>
+        <p:spPr>
+          <a:xfrm>
+            <a:off x="1088393" y="2352698"/>
+            <a:ext cx="10178322" cy="1492132"/>
+          </a:xfrm>
+        </p:spPr>
+        <p:txBody>
+          <a:bodyPr>
+            <a:normAutofit/>
+          </a:bodyPr>
+          <a:lstStyle/>
+          <a:p>
+            <a:pPr algn="ctr"/>
+            <a:r>
+              <a:rPr lang="en-CA" sz="8000" dirty="0" err="1"/>
+              <a:t>DEmo</a:t>
+            </a:r>
+            <a:endParaRPr lang="en-CA" sz="8000" dirty="0"/>
+          </a:p>
+        </p:txBody>
+      </p:sp>
+    </p:spTree>
+    <p:extLst>
+      <p:ext uri="{BB962C8B-B14F-4D97-AF65-F5344CB8AC3E}">
+        <p14:creationId xmlns:p14="http://schemas.microsoft.com/office/powerpoint/2010/main" val="3384724540"/>
+      </p:ext>
+    </p:extLst>
+  </p:cSld>
+  <p:clrMapOvr>
+    <a:masterClrMapping/>
+  </p:clrMapOvr>
+</p:sld>
+</file>
+
+<file path=ppt/slides/slide2.xml><?xml version="1.0" encoding="utf-8"?>
+<p:sld xmlns:a="http://schemas.openxmlformats.org/drawingml/2006/main" xmlns:r="http://schemas.openxmlformats.org/officeDocument/2006/relationships" xmlns:p="http://schemas.openxmlformats.org/presentationml/2006/main">
+  <p:cSld>
+    <p:spTree>
+      <p:nvGrpSpPr>
+        <p:cNvPr id="1" name=""/>
+        <p:cNvGrpSpPr/>
+        <p:nvPr/>
+      </p:nvGrpSpPr>
+      <p:grpSpPr>
+        <a:xfrm>
+          <a:off x="0" y="0"/>
+          <a:ext cx="0" cy="0"/>
+          <a:chOff x="0" y="0"/>
+          <a:chExt cx="0" cy="0"/>
+        </a:xfrm>
+      </p:grpSpPr>
+      <p:sp>
+        <p:nvSpPr>
+          <p:cNvPr id="2" name="Title 1"/>
+          <p:cNvSpPr>
+            <a:spLocks noGrp="1"/>
+          </p:cNvSpPr>
+          <p:nvPr>
+            <p:ph type="title"/>
+          </p:nvPr>
+        </p:nvSpPr>
+        <p:spPr>
+          <a:xfrm>
+            <a:off x="1244303" y="399942"/>
+            <a:ext cx="10178322" cy="1053126"/>
+          </a:xfrm>
+        </p:spPr>
+        <p:txBody>
+          <a:bodyPr>
+            <a:noAutofit/>
+          </a:bodyPr>
+          <a:lstStyle/>
+          <a:p>
+            <a:pPr>
+              <a:lnSpc>
+                <a:spcPct val="100000"/>
+              </a:lnSpc>
+            </a:pPr>
+            <a:r>
+              <a:rPr lang="en-CA" sz="7200" dirty="0"/>
+              <a:t>The Team</a:t>
+            </a:r>
+            <a:endParaRPr lang="en-US" sz="7200" dirty="0"/>
+          </a:p>
+        </p:txBody>
+      </p:sp>
+      <p:graphicFrame>
+        <p:nvGraphicFramePr>
+          <p:cNvPr id="4" name="Content Placeholder 3"/>
+          <p:cNvGraphicFramePr>
+            <a:graphicFrameLocks noGrp="1"/>
+          </p:cNvGraphicFramePr>
+          <p:nvPr>
+            <p:ph idx="1"/>
+            <p:extLst>
+              <p:ext uri="{D42A27DB-BD31-4B8C-83A1-F6EECF244321}">
+                <p14:modId xmlns:p14="http://schemas.microsoft.com/office/powerpoint/2010/main" val="1010300937"/>
+              </p:ext>
+            </p:extLst>
+          </p:nvPr>
+        </p:nvGraphicFramePr>
+        <p:xfrm>
+          <a:off x="736451" y="2266335"/>
+          <a:ext cx="11346427" cy="3108960"/>
+        </p:xfrm>
+        <a:graphic>
+          <a:graphicData uri="http://schemas.openxmlformats.org/drawingml/2006/table">
+            <a:tbl>
+              <a:tblPr firstRow="1" bandRow="1">
+                <a:tableStyleId>{2D5ABB26-0587-4C30-8999-92F81FD0307C}</a:tableStyleId>
+              </a:tblPr>
+              <a:tblGrid>
+                <a:gridCol w="3500285">
+                  <a:extLst>
+                    <a:ext uri="{9D8B030D-6E8A-4147-A177-3AD203B41FA5}">
+                      <a16:colId xmlns:a16="http://schemas.microsoft.com/office/drawing/2014/main" val="2565215050"/>
+                    </a:ext>
+                  </a:extLst>
+                </a:gridCol>
+                <a:gridCol w="394258">
+                  <a:extLst>
+                    <a:ext uri="{9D8B030D-6E8A-4147-A177-3AD203B41FA5}">
+                      <a16:colId xmlns:a16="http://schemas.microsoft.com/office/drawing/2014/main" val="3279567016"/>
+                    </a:ext>
+                  </a:extLst>
+                </a:gridCol>
+                <a:gridCol w="7451884">
+                  <a:extLst>
+                    <a:ext uri="{9D8B030D-6E8A-4147-A177-3AD203B41FA5}">
+                      <a16:colId xmlns:a16="http://schemas.microsoft.com/office/drawing/2014/main" val="3702030157"/>
+                    </a:ext>
+                  </a:extLst>
+                </a:gridCol>
+              </a:tblGrid>
+              <a:tr h="370840">
+                <a:tc>
+                  <a:txBody>
+                    <a:bodyPr/>
+                    <a:lstStyle/>
+                    <a:p>
+                      <a:pPr algn="r"/>
+                      <a:r>
+                        <a:rPr lang="en-CA" sz="2800" dirty="0"/>
+                        <a:t>Zachary Bazen </a:t>
+                      </a:r>
+                      <a:endParaRPr lang="en-US" sz="2800" dirty="0"/>
+                    </a:p>
+                  </a:txBody>
+                  <a:tcPr>
+                    <a:lnL w="12700" cap="flat" cmpd="sng" algn="ctr">
+                      <a:noFill/>
+                      <a:prstDash val="solid"/>
+                      <a:round/>
+                      <a:headEnd type="none" w="med" len="med"/>
+                      <a:tailEnd type="none" w="med" len="med"/>
+                    </a:lnL>
+                    <a:lnR w="12700" cap="flat" cmpd="sng" algn="ctr">
+                      <a:noFill/>
+                      <a:prstDash val="solid"/>
+                      <a:round/>
+                      <a:headEnd type="none" w="med" len="med"/>
+                      <a:tailEnd type="none" w="med" len="med"/>
+                    </a:lnR>
+                    <a:lnT w="12700" cap="flat" cmpd="sng" algn="ctr">
+                      <a:noFill/>
+                      <a:prstDash val="solid"/>
+                      <a:round/>
+                      <a:headEnd type="none" w="med" len="med"/>
+                      <a:tailEnd type="none" w="med" len="med"/>
+                    </a:lnT>
+                    <a:lnB w="12700" cap="flat" cmpd="sng" algn="ctr">
+                      <a:noFill/>
+                      <a:prstDash val="solid"/>
+                      <a:round/>
+                      <a:headEnd type="none" w="med" len="med"/>
+                      <a:tailEnd type="none" w="med" len="med"/>
+                    </a:lnB>
+                    <a:lnTlToBr w="12700" cmpd="sng">
+                      <a:noFill/>
+                      <a:prstDash val="solid"/>
+                    </a:lnTlToBr>
+                    <a:lnBlToTr w="12700" cmpd="sng">
+                      <a:noFill/>
+                      <a:prstDash val="solid"/>
+                    </a:lnBlToTr>
+                  </a:tcPr>
+                </a:tc>
+                <a:tc>
+                  <a:txBody>
+                    <a:bodyPr/>
+                    <a:lstStyle/>
+                    <a:p>
+                      <a:pPr algn="ctr"/>
+                      <a:r>
+                        <a:rPr lang="en-CA" sz="2800" dirty="0"/>
+                        <a:t>-</a:t>
+                      </a:r>
+                      <a:endParaRPr lang="en-US" sz="2800" dirty="0"/>
+                    </a:p>
+                  </a:txBody>
+                  <a:tcPr>
+                    <a:lnL w="12700" cap="flat" cmpd="sng" algn="ctr">
+                      <a:noFill/>
+                      <a:prstDash val="solid"/>
+                      <a:round/>
+                      <a:headEnd type="none" w="med" len="med"/>
+                      <a:tailEnd type="none" w="med" len="med"/>
+                    </a:lnL>
+                    <a:lnR w="12700" cap="flat" cmpd="sng" algn="ctr">
+                      <a:noFill/>
+                      <a:prstDash val="solid"/>
+                      <a:round/>
+                      <a:headEnd type="none" w="med" len="med"/>
+                      <a:tailEnd type="none" w="med" len="med"/>
+                    </a:lnR>
+                    <a:lnT w="12700" cap="flat" cmpd="sng" algn="ctr">
+                      <a:noFill/>
+                      <a:prstDash val="solid"/>
+                      <a:round/>
+                      <a:headEnd type="none" w="med" len="med"/>
+                      <a:tailEnd type="none" w="med" len="med"/>
+                    </a:lnT>
+                    <a:lnB w="12700" cap="flat" cmpd="sng" algn="ctr">
+                      <a:noFill/>
+                      <a:prstDash val="solid"/>
+                      <a:round/>
+                      <a:headEnd type="none" w="med" len="med"/>
+                      <a:tailEnd type="none" w="med" len="med"/>
+                    </a:lnB>
+                    <a:lnTlToBr w="12700" cmpd="sng">
+                      <a:noFill/>
+                      <a:prstDash val="solid"/>
+                    </a:lnTlToBr>
+                    <a:lnBlToTr w="12700" cmpd="sng">
+                      <a:noFill/>
+                      <a:prstDash val="solid"/>
+                    </a:lnBlToTr>
+                  </a:tcPr>
+                </a:tc>
+                <a:tc>
+                  <a:txBody>
+                    <a:bodyPr/>
+                    <a:lstStyle/>
+                    <a:p>
+                      <a:pPr algn="l"/>
+                      <a:r>
+                        <a:rPr lang="en-CA" sz="2800" i="1" dirty="0"/>
+                        <a:t>Software Engineering</a:t>
+                      </a:r>
+                      <a:r>
+                        <a:rPr lang="en-CA" sz="2800" i="1" baseline="0" dirty="0"/>
+                        <a:t> </a:t>
+                      </a:r>
+                      <a:endParaRPr lang="en-US" sz="2800" i="1" dirty="0"/>
+                    </a:p>
+                  </a:txBody>
+                  <a:tcPr>
+                    <a:lnL w="12700" cap="flat" cmpd="sng" algn="ctr">
+                      <a:noFill/>
+                      <a:prstDash val="solid"/>
+                      <a:round/>
+                      <a:headEnd type="none" w="med" len="med"/>
+                      <a:tailEnd type="none" w="med" len="med"/>
+                    </a:lnL>
+                    <a:lnR w="12700" cap="flat" cmpd="sng" algn="ctr">
+                      <a:noFill/>
+                      <a:prstDash val="solid"/>
+                      <a:round/>
+                      <a:headEnd type="none" w="med" len="med"/>
+                      <a:tailEnd type="none" w="med" len="med"/>
+                    </a:lnR>
+                    <a:lnT w="12700" cap="flat" cmpd="sng" algn="ctr">
+                      <a:noFill/>
+                      <a:prstDash val="solid"/>
+                      <a:round/>
+                      <a:headEnd type="none" w="med" len="med"/>
+                      <a:tailEnd type="none" w="med" len="med"/>
+                    </a:lnT>
+                    <a:lnB w="12700" cap="flat" cmpd="sng" algn="ctr">
+                      <a:noFill/>
+                      <a:prstDash val="solid"/>
+                      <a:round/>
+                      <a:headEnd type="none" w="med" len="med"/>
+                      <a:tailEnd type="none" w="med" len="med"/>
+                    </a:lnB>
+                    <a:lnTlToBr w="12700" cmpd="sng">
+                      <a:noFill/>
+                      <a:prstDash val="solid"/>
+                    </a:lnTlToBr>
+                    <a:lnBlToTr w="12700" cmpd="sng">
+                      <a:noFill/>
+                      <a:prstDash val="solid"/>
+                    </a:lnBlToTr>
+                  </a:tcPr>
+                </a:tc>
+                <a:extLst>
+                  <a:ext uri="{0D108BD9-81ED-4DB2-BD59-A6C34878D82A}">
+                    <a16:rowId xmlns:a16="http://schemas.microsoft.com/office/drawing/2014/main" val="3950718333"/>
+                  </a:ext>
+                </a:extLst>
+              </a:tr>
+              <a:tr h="370840">
+                <a:tc>
+                  <a:txBody>
+                    <a:bodyPr/>
+                    <a:lstStyle/>
+                    <a:p>
+                      <a:pPr algn="r"/>
+                      <a:r>
+                        <a:rPr lang="en-CA" sz="2800" dirty="0">
+                          <a:solidFill>
+                            <a:schemeClr val="tx1"/>
+                          </a:solidFill>
+                        </a:rPr>
+                        <a:t>Jean-</a:t>
+                      </a:r>
+                      <a:r>
+                        <a:rPr lang="en-US" sz="2800" dirty="0">
+                          <a:solidFill>
+                            <a:schemeClr val="tx1"/>
+                          </a:solidFill>
+                        </a:rPr>
+                        <a:t>Lucas Ferreira</a:t>
+                      </a:r>
+                      <a:r>
+                        <a:rPr lang="en-CA" sz="2800" dirty="0">
+                          <a:solidFill>
+                            <a:schemeClr val="tx1"/>
+                          </a:solidFill>
+                        </a:rPr>
+                        <a:t> </a:t>
+                      </a:r>
+                      <a:endParaRPr lang="en-US" sz="2800" dirty="0">
+                        <a:solidFill>
+                          <a:schemeClr val="tx1"/>
+                        </a:solidFill>
+                      </a:endParaRPr>
+                    </a:p>
+                  </a:txBody>
+                  <a:tcPr>
+                    <a:lnL w="12700" cap="flat" cmpd="sng" algn="ctr">
+                      <a:noFill/>
+                      <a:prstDash val="solid"/>
+                      <a:round/>
+                      <a:headEnd type="none" w="med" len="med"/>
+                      <a:tailEnd type="none" w="med" len="med"/>
+                    </a:lnL>
+                    <a:lnR w="12700" cap="flat" cmpd="sng" algn="ctr">
+                      <a:noFill/>
+                      <a:prstDash val="solid"/>
+                      <a:round/>
+                      <a:headEnd type="none" w="med" len="med"/>
+                      <a:tailEnd type="none" w="med" len="med"/>
+                    </a:lnR>
+                    <a:lnT w="12700" cap="flat" cmpd="sng" algn="ctr">
+                      <a:noFill/>
+                      <a:prstDash val="solid"/>
+                      <a:round/>
+                      <a:headEnd type="none" w="med" len="med"/>
+                      <a:tailEnd type="none" w="med" len="med"/>
+                    </a:lnT>
+                    <a:lnB w="12700" cap="flat" cmpd="sng" algn="ctr">
+                      <a:noFill/>
+                      <a:prstDash val="solid"/>
+                      <a:round/>
+                      <a:headEnd type="none" w="med" len="med"/>
+                      <a:tailEnd type="none" w="med" len="med"/>
+                    </a:lnB>
+                    <a:lnTlToBr w="12700" cmpd="sng">
+                      <a:noFill/>
+                      <a:prstDash val="solid"/>
+                    </a:lnTlToBr>
+                    <a:lnBlToTr w="12700" cmpd="sng">
+                      <a:noFill/>
+                      <a:prstDash val="solid"/>
+                    </a:lnBlToTr>
+                  </a:tcPr>
+                </a:tc>
+                <a:tc>
+                  <a:txBody>
+                    <a:bodyPr/>
+                    <a:lstStyle/>
+                    <a:p>
+                      <a:pPr algn="ctr"/>
+                      <a:r>
+                        <a:rPr lang="en-CA" sz="2800" dirty="0">
+                          <a:solidFill>
+                            <a:schemeClr val="tx1"/>
+                          </a:solidFill>
+                        </a:rPr>
+                        <a:t>-</a:t>
+                      </a:r>
+                      <a:endParaRPr lang="en-US" sz="2800" dirty="0">
+                        <a:solidFill>
+                          <a:schemeClr val="tx1"/>
+                        </a:solidFill>
+                      </a:endParaRPr>
+                    </a:p>
+                  </a:txBody>
+                  <a:tcPr>
+                    <a:lnL w="12700" cap="flat" cmpd="sng" algn="ctr">
+                      <a:noFill/>
+                      <a:prstDash val="solid"/>
+                      <a:round/>
+                      <a:headEnd type="none" w="med" len="med"/>
+                      <a:tailEnd type="none" w="med" len="med"/>
+                    </a:lnL>
+                    <a:lnR w="12700" cap="flat" cmpd="sng" algn="ctr">
+                      <a:noFill/>
+                      <a:prstDash val="solid"/>
+                      <a:round/>
+                      <a:headEnd type="none" w="med" len="med"/>
+                      <a:tailEnd type="none" w="med" len="med"/>
+                    </a:lnR>
+                    <a:lnT w="12700" cap="flat" cmpd="sng" algn="ctr">
+                      <a:noFill/>
+                      <a:prstDash val="solid"/>
+                      <a:round/>
+                      <a:headEnd type="none" w="med" len="med"/>
+                      <a:tailEnd type="none" w="med" len="med"/>
+                    </a:lnT>
+                    <a:lnB w="12700" cap="flat" cmpd="sng" algn="ctr">
+                      <a:noFill/>
+                      <a:prstDash val="solid"/>
+                      <a:round/>
+                      <a:headEnd type="none" w="med" len="med"/>
+                      <a:tailEnd type="none" w="med" len="med"/>
+                    </a:lnB>
+                    <a:lnTlToBr w="12700" cmpd="sng">
+                      <a:noFill/>
+                      <a:prstDash val="solid"/>
+                    </a:lnTlToBr>
+                    <a:lnBlToTr w="12700" cmpd="sng">
+                      <a:noFill/>
+                      <a:prstDash val="solid"/>
+                    </a:lnBlToTr>
+                  </a:tcPr>
+                </a:tc>
+                <a:tc>
+                  <a:txBody>
+                    <a:bodyPr/>
+                    <a:lstStyle/>
+                    <a:p>
+                      <a:pPr marL="0" marR="0" lvl="0" indent="0" algn="l" defTabSz="914400" rtl="0" eaLnBrk="1" fontAlgn="auto" latinLnBrk="0" hangingPunct="1">
+                        <a:lnSpc>
+                          <a:spcPct val="100000"/>
+                        </a:lnSpc>
+                        <a:spcBef>
+                          <a:spcPts val="0"/>
+                        </a:spcBef>
+                        <a:spcAft>
+                          <a:spcPts val="0"/>
+                        </a:spcAft>
+                        <a:buClrTx/>
+                        <a:buSzTx/>
+                        <a:buFontTx/>
+                        <a:buNone/>
+                        <a:tabLst/>
+                        <a:defRPr/>
+                      </a:pPr>
+                      <a:r>
+                        <a:rPr lang="en-CA" sz="2800" i="1" dirty="0">
+                          <a:solidFill>
+                            <a:schemeClr val="tx1"/>
+                          </a:solidFill>
+                        </a:rPr>
+                        <a:t>Software Engineering</a:t>
+                      </a:r>
+                      <a:r>
+                        <a:rPr lang="en-CA" sz="2800" i="1" baseline="0" dirty="0">
+                          <a:solidFill>
+                            <a:schemeClr val="tx1"/>
+                          </a:solidFill>
+                        </a:rPr>
+                        <a:t> </a:t>
+                      </a:r>
+                      <a:endParaRPr lang="en-US" sz="2800" i="1" dirty="0">
+                        <a:solidFill>
+                          <a:schemeClr val="tx1"/>
+                        </a:solidFill>
+                      </a:endParaRPr>
+                    </a:p>
+                  </a:txBody>
+                  <a:tcPr>
+                    <a:lnL w="12700" cap="flat" cmpd="sng" algn="ctr">
+                      <a:noFill/>
+                      <a:prstDash val="solid"/>
+                      <a:round/>
+                      <a:headEnd type="none" w="med" len="med"/>
+                      <a:tailEnd type="none" w="med" len="med"/>
+                    </a:lnL>
+                    <a:lnR w="12700" cap="flat" cmpd="sng" algn="ctr">
+                      <a:noFill/>
+                      <a:prstDash val="solid"/>
+                      <a:round/>
+                      <a:headEnd type="none" w="med" len="med"/>
+                      <a:tailEnd type="none" w="med" len="med"/>
+                    </a:lnR>
+                    <a:lnT w="12700" cap="flat" cmpd="sng" algn="ctr">
+                      <a:noFill/>
+                      <a:prstDash val="solid"/>
+                      <a:round/>
+                      <a:headEnd type="none" w="med" len="med"/>
+                      <a:tailEnd type="none" w="med" len="med"/>
+                    </a:lnT>
+                    <a:lnB w="12700" cap="flat" cmpd="sng" algn="ctr">
+                      <a:noFill/>
+                      <a:prstDash val="solid"/>
+                      <a:round/>
+                      <a:headEnd type="none" w="med" len="med"/>
+                      <a:tailEnd type="none" w="med" len="med"/>
+                    </a:lnB>
+                    <a:lnTlToBr w="12700" cmpd="sng">
+                      <a:noFill/>
+                      <a:prstDash val="solid"/>
+                    </a:lnTlToBr>
+                    <a:lnBlToTr w="12700" cmpd="sng">
+                      <a:noFill/>
+                      <a:prstDash val="solid"/>
+                    </a:lnBlToTr>
+                  </a:tcPr>
+                </a:tc>
+                <a:extLst>
+                  <a:ext uri="{0D108BD9-81ED-4DB2-BD59-A6C34878D82A}">
+                    <a16:rowId xmlns:a16="http://schemas.microsoft.com/office/drawing/2014/main" val="2377837653"/>
+                  </a:ext>
+                </a:extLst>
+              </a:tr>
+              <a:tr h="370840">
+                <a:tc>
+                  <a:txBody>
+                    <a:bodyPr/>
+                    <a:lstStyle/>
+                    <a:p>
+                      <a:pPr algn="r"/>
+                      <a:r>
+                        <a:rPr lang="en-US" sz="2800" dirty="0"/>
+                        <a:t>Alexander Jackson </a:t>
+                      </a:r>
+                    </a:p>
+                  </a:txBody>
+                  <a:tcPr>
+                    <a:lnL w="12700" cap="flat" cmpd="sng" algn="ctr">
+                      <a:noFill/>
+                      <a:prstDash val="solid"/>
+                      <a:round/>
+                      <a:headEnd type="none" w="med" len="med"/>
+                      <a:tailEnd type="none" w="med" len="med"/>
+                    </a:lnL>
+                    <a:lnR w="12700" cap="flat" cmpd="sng" algn="ctr">
+                      <a:noFill/>
+                      <a:prstDash val="solid"/>
+                      <a:round/>
+                      <a:headEnd type="none" w="med" len="med"/>
+                      <a:tailEnd type="none" w="med" len="med"/>
+                    </a:lnR>
+                    <a:lnT w="12700" cap="flat" cmpd="sng" algn="ctr">
+                      <a:noFill/>
+                      <a:prstDash val="solid"/>
+                      <a:round/>
+                      <a:headEnd type="none" w="med" len="med"/>
+                      <a:tailEnd type="none" w="med" len="med"/>
+                    </a:lnT>
+                    <a:lnB w="12700" cap="flat" cmpd="sng" algn="ctr">
+                      <a:noFill/>
+                      <a:prstDash val="solid"/>
+                      <a:round/>
+                      <a:headEnd type="none" w="med" len="med"/>
+                      <a:tailEnd type="none" w="med" len="med"/>
+                    </a:lnB>
+                    <a:lnTlToBr w="12700" cmpd="sng">
+                      <a:noFill/>
+                      <a:prstDash val="solid"/>
+                    </a:lnTlToBr>
+                    <a:lnBlToTr w="12700" cmpd="sng">
+                      <a:noFill/>
+                      <a:prstDash val="solid"/>
+                    </a:lnBlToTr>
+                  </a:tcPr>
+                </a:tc>
+                <a:tc>
+                  <a:txBody>
+                    <a:bodyPr/>
+                    <a:lstStyle/>
+                    <a:p>
+                      <a:pPr algn="ctr"/>
+                      <a:r>
+                        <a:rPr lang="en-CA" sz="2800" dirty="0"/>
+                        <a:t>-</a:t>
+                      </a:r>
+                      <a:endParaRPr lang="en-US" sz="2800" dirty="0"/>
+                    </a:p>
+                  </a:txBody>
+                  <a:tcPr>
+                    <a:lnL w="12700" cap="flat" cmpd="sng" algn="ctr">
+                      <a:noFill/>
+                      <a:prstDash val="solid"/>
+                      <a:round/>
+                      <a:headEnd type="none" w="med" len="med"/>
+                      <a:tailEnd type="none" w="med" len="med"/>
+                    </a:lnL>
+                    <a:lnR w="12700" cap="flat" cmpd="sng" algn="ctr">
+                      <a:noFill/>
+                      <a:prstDash val="solid"/>
+                      <a:round/>
+                      <a:headEnd type="none" w="med" len="med"/>
+                      <a:tailEnd type="none" w="med" len="med"/>
+                    </a:lnR>
+                    <a:lnT w="12700" cap="flat" cmpd="sng" algn="ctr">
+                      <a:noFill/>
+                      <a:prstDash val="solid"/>
+                      <a:round/>
+                      <a:headEnd type="none" w="med" len="med"/>
+                      <a:tailEnd type="none" w="med" len="med"/>
+                    </a:lnT>
+                    <a:lnB w="12700" cap="flat" cmpd="sng" algn="ctr">
+                      <a:noFill/>
+                      <a:prstDash val="solid"/>
+                      <a:round/>
+                      <a:headEnd type="none" w="med" len="med"/>
+                      <a:tailEnd type="none" w="med" len="med"/>
+                    </a:lnB>
+                    <a:lnTlToBr w="12700" cmpd="sng">
+                      <a:noFill/>
+                      <a:prstDash val="solid"/>
+                    </a:lnTlToBr>
+                    <a:lnBlToTr w="12700" cmpd="sng">
+                      <a:noFill/>
+                      <a:prstDash val="solid"/>
+                    </a:lnBlToTr>
+                  </a:tcPr>
+                </a:tc>
+                <a:tc>
+                  <a:txBody>
+                    <a:bodyPr/>
+                    <a:lstStyle/>
+                    <a:p>
+                      <a:pPr algn="l"/>
+                      <a:r>
+                        <a:rPr lang="en-CA" sz="2800" i="1" dirty="0"/>
+                        <a:t>Software Engineering</a:t>
+                      </a:r>
+                      <a:endParaRPr lang="en-US" sz="2800" i="1" dirty="0"/>
+                    </a:p>
+                  </a:txBody>
+                  <a:tcPr>
+                    <a:lnL w="12700" cap="flat" cmpd="sng" algn="ctr">
+                      <a:noFill/>
+                      <a:prstDash val="solid"/>
+                      <a:round/>
+                      <a:headEnd type="none" w="med" len="med"/>
+                      <a:tailEnd type="none" w="med" len="med"/>
+                    </a:lnL>
+                    <a:lnR w="12700" cap="flat" cmpd="sng" algn="ctr">
+                      <a:noFill/>
+                      <a:prstDash val="solid"/>
+                      <a:round/>
+                      <a:headEnd type="none" w="med" len="med"/>
+                      <a:tailEnd type="none" w="med" len="med"/>
+                    </a:lnR>
+                    <a:lnT w="12700" cap="flat" cmpd="sng" algn="ctr">
+                      <a:noFill/>
+                      <a:prstDash val="solid"/>
+                      <a:round/>
+                      <a:headEnd type="none" w="med" len="med"/>
+                      <a:tailEnd type="none" w="med" len="med"/>
+                    </a:lnT>
+                    <a:lnB w="12700" cap="flat" cmpd="sng" algn="ctr">
+                      <a:noFill/>
+                      <a:prstDash val="solid"/>
+                      <a:round/>
+                      <a:headEnd type="none" w="med" len="med"/>
+                      <a:tailEnd type="none" w="med" len="med"/>
+                    </a:lnB>
+                    <a:lnTlToBr w="12700" cmpd="sng">
+                      <a:noFill/>
+                      <a:prstDash val="solid"/>
+                    </a:lnTlToBr>
+                    <a:lnBlToTr w="12700" cmpd="sng">
+                      <a:noFill/>
+                      <a:prstDash val="solid"/>
+                    </a:lnBlToTr>
+                  </a:tcPr>
+                </a:tc>
+                <a:extLst>
+                  <a:ext uri="{0D108BD9-81ED-4DB2-BD59-A6C34878D82A}">
+                    <a16:rowId xmlns:a16="http://schemas.microsoft.com/office/drawing/2014/main" val="817088776"/>
+                  </a:ext>
+                </a:extLst>
+              </a:tr>
+              <a:tr h="370840">
+                <a:tc>
+                  <a:txBody>
+                    <a:bodyPr/>
+                    <a:lstStyle/>
+                    <a:p>
+                      <a:pPr algn="r"/>
+                      <a:r>
+                        <a:rPr lang="en-US" sz="2800" dirty="0"/>
+                        <a:t>Justin </a:t>
+                      </a:r>
+                      <a:r>
+                        <a:rPr lang="en-US" sz="2800" dirty="0" err="1"/>
+                        <a:t>Kapinski</a:t>
+                      </a:r>
+                      <a:r>
+                        <a:rPr lang="en-US" sz="2800" dirty="0"/>
+                        <a:t> </a:t>
+                      </a:r>
+                    </a:p>
+                  </a:txBody>
+                  <a:tcPr>
+                    <a:lnL w="12700" cap="flat" cmpd="sng" algn="ctr">
+                      <a:noFill/>
+                      <a:prstDash val="solid"/>
+                      <a:round/>
+                      <a:headEnd type="none" w="med" len="med"/>
+                      <a:tailEnd type="none" w="med" len="med"/>
+                    </a:lnL>
+                    <a:lnR w="12700" cap="flat" cmpd="sng" algn="ctr">
+                      <a:noFill/>
+                      <a:prstDash val="solid"/>
+                      <a:round/>
+                      <a:headEnd type="none" w="med" len="med"/>
+                      <a:tailEnd type="none" w="med" len="med"/>
+                    </a:lnR>
+                    <a:lnT w="12700" cap="flat" cmpd="sng" algn="ctr">
+                      <a:noFill/>
+                      <a:prstDash val="solid"/>
+                      <a:round/>
+                      <a:headEnd type="none" w="med" len="med"/>
+                      <a:tailEnd type="none" w="med" len="med"/>
+                    </a:lnT>
+                    <a:lnB w="12700" cap="flat" cmpd="sng" algn="ctr">
+                      <a:noFill/>
+                      <a:prstDash val="solid"/>
+                      <a:round/>
+                      <a:headEnd type="none" w="med" len="med"/>
+                      <a:tailEnd type="none" w="med" len="med"/>
+                    </a:lnB>
+                    <a:lnTlToBr w="12700" cmpd="sng">
+                      <a:noFill/>
+                      <a:prstDash val="solid"/>
+                    </a:lnTlToBr>
+                    <a:lnBlToTr w="12700" cmpd="sng">
+                      <a:noFill/>
+                      <a:prstDash val="solid"/>
+                    </a:lnBlToTr>
+                  </a:tcPr>
+                </a:tc>
+                <a:tc>
+                  <a:txBody>
+                    <a:bodyPr/>
+                    <a:lstStyle/>
+                    <a:p>
+                      <a:pPr algn="ctr"/>
+                      <a:r>
+                        <a:rPr lang="en-CA" sz="2800" dirty="0"/>
+                        <a:t>-</a:t>
+                      </a:r>
+                      <a:endParaRPr lang="en-US" sz="2800" dirty="0"/>
+                    </a:p>
+                  </a:txBody>
+                  <a:tcPr>
+                    <a:lnL w="12700" cap="flat" cmpd="sng" algn="ctr">
+                      <a:noFill/>
+                      <a:prstDash val="solid"/>
+                      <a:round/>
+                      <a:headEnd type="none" w="med" len="med"/>
+                      <a:tailEnd type="none" w="med" len="med"/>
+                    </a:lnL>
+                    <a:lnR w="12700" cap="flat" cmpd="sng" algn="ctr">
+                      <a:noFill/>
+                      <a:prstDash val="solid"/>
+                      <a:round/>
+                      <a:headEnd type="none" w="med" len="med"/>
+                      <a:tailEnd type="none" w="med" len="med"/>
+                    </a:lnR>
+                    <a:lnT w="12700" cap="flat" cmpd="sng" algn="ctr">
+                      <a:noFill/>
+                      <a:prstDash val="solid"/>
+                      <a:round/>
+                      <a:headEnd type="none" w="med" len="med"/>
+                      <a:tailEnd type="none" w="med" len="med"/>
+                    </a:lnT>
+                    <a:lnB w="12700" cap="flat" cmpd="sng" algn="ctr">
+                      <a:noFill/>
+                      <a:prstDash val="solid"/>
+                      <a:round/>
+                      <a:headEnd type="none" w="med" len="med"/>
+                      <a:tailEnd type="none" w="med" len="med"/>
+                    </a:lnB>
+                    <a:lnTlToBr w="12700" cmpd="sng">
+                      <a:noFill/>
+                      <a:prstDash val="solid"/>
+                    </a:lnTlToBr>
+                    <a:lnBlToTr w="12700" cmpd="sng">
+                      <a:noFill/>
+                      <a:prstDash val="solid"/>
+                    </a:lnBlToTr>
+                  </a:tcPr>
+                </a:tc>
+                <a:tc>
+                  <a:txBody>
+                    <a:bodyPr/>
+                    <a:lstStyle/>
+                    <a:p>
+                      <a:pPr algn="l"/>
+                      <a:r>
+                        <a:rPr lang="en-CA" sz="2800" i="1" dirty="0"/>
+                        <a:t>Software Engineering</a:t>
+                      </a:r>
+                      <a:endParaRPr lang="en-US" sz="2800" i="1" dirty="0"/>
+                    </a:p>
+                  </a:txBody>
+                  <a:tcPr>
+                    <a:lnL w="12700" cap="flat" cmpd="sng" algn="ctr">
+                      <a:noFill/>
+                      <a:prstDash val="solid"/>
+                      <a:round/>
+                      <a:headEnd type="none" w="med" len="med"/>
+                      <a:tailEnd type="none" w="med" len="med"/>
+                    </a:lnL>
+                    <a:lnR w="12700" cap="flat" cmpd="sng" algn="ctr">
+                      <a:noFill/>
+                      <a:prstDash val="solid"/>
+                      <a:round/>
+                      <a:headEnd type="none" w="med" len="med"/>
+                      <a:tailEnd type="none" w="med" len="med"/>
+                    </a:lnR>
+                    <a:lnT w="12700" cap="flat" cmpd="sng" algn="ctr">
+                      <a:noFill/>
+                      <a:prstDash val="solid"/>
+                      <a:round/>
+                      <a:headEnd type="none" w="med" len="med"/>
+                      <a:tailEnd type="none" w="med" len="med"/>
+                    </a:lnT>
+                    <a:lnB w="12700" cap="flat" cmpd="sng" algn="ctr">
+                      <a:noFill/>
+                      <a:prstDash val="solid"/>
+                      <a:round/>
+                      <a:headEnd type="none" w="med" len="med"/>
+                      <a:tailEnd type="none" w="med" len="med"/>
+                    </a:lnB>
+                    <a:lnTlToBr w="12700" cmpd="sng">
+                      <a:noFill/>
+                      <a:prstDash val="solid"/>
+                    </a:lnTlToBr>
+                    <a:lnBlToTr w="12700" cmpd="sng">
+                      <a:noFill/>
+                      <a:prstDash val="solid"/>
+                    </a:lnBlToTr>
+                  </a:tcPr>
+                </a:tc>
+                <a:extLst>
+                  <a:ext uri="{0D108BD9-81ED-4DB2-BD59-A6C34878D82A}">
+                    <a16:rowId xmlns:a16="http://schemas.microsoft.com/office/drawing/2014/main" val="294341159"/>
+                  </a:ext>
+                </a:extLst>
+              </a:tr>
+              <a:tr h="370840">
+                <a:tc>
+                  <a:txBody>
+                    <a:bodyPr/>
+                    <a:lstStyle/>
+                    <a:p>
+                      <a:pPr algn="r"/>
+                      <a:r>
+                        <a:rPr lang="en-US" sz="2800" dirty="0"/>
+                        <a:t>Mathew </a:t>
+                      </a:r>
+                      <a:r>
+                        <a:rPr lang="en-US" sz="2800" dirty="0" err="1"/>
+                        <a:t>Hobers</a:t>
+                      </a:r>
+                      <a:endParaRPr lang="en-US" sz="2800" dirty="0"/>
+                    </a:p>
+                  </a:txBody>
+                  <a:tcPr>
+                    <a:lnL w="12700" cap="flat" cmpd="sng" algn="ctr">
+                      <a:noFill/>
+                      <a:prstDash val="solid"/>
+                      <a:round/>
+                      <a:headEnd type="none" w="med" len="med"/>
+                      <a:tailEnd type="none" w="med" len="med"/>
+                    </a:lnL>
+                    <a:lnR w="12700" cap="flat" cmpd="sng" algn="ctr">
+                      <a:noFill/>
+                      <a:prstDash val="solid"/>
+                      <a:round/>
+                      <a:headEnd type="none" w="med" len="med"/>
+                      <a:tailEnd type="none" w="med" len="med"/>
+                    </a:lnR>
+                    <a:lnT w="12700" cap="flat" cmpd="sng" algn="ctr">
+                      <a:noFill/>
+                      <a:prstDash val="solid"/>
+                      <a:round/>
+                      <a:headEnd type="none" w="med" len="med"/>
+                      <a:tailEnd type="none" w="med" len="med"/>
+                    </a:lnT>
+                    <a:lnB w="12700" cap="flat" cmpd="sng" algn="ctr">
+                      <a:noFill/>
+                      <a:prstDash val="solid"/>
+                      <a:round/>
+                      <a:headEnd type="none" w="med" len="med"/>
+                      <a:tailEnd type="none" w="med" len="med"/>
+                    </a:lnB>
+                    <a:lnTlToBr w="12700" cmpd="sng">
+                      <a:noFill/>
+                      <a:prstDash val="solid"/>
+                    </a:lnTlToBr>
+                    <a:lnBlToTr w="12700" cmpd="sng">
+                      <a:noFill/>
+                      <a:prstDash val="solid"/>
+                    </a:lnBlToTr>
+                  </a:tcPr>
+                </a:tc>
+                <a:tc>
+                  <a:txBody>
+                    <a:bodyPr/>
+                    <a:lstStyle/>
+                    <a:p>
+                      <a:pPr algn="ctr"/>
+                      <a:r>
+                        <a:rPr lang="en-CA" sz="2800" dirty="0"/>
+                        <a:t>-</a:t>
+                      </a:r>
+                      <a:endParaRPr lang="en-US" sz="2800" dirty="0"/>
+                    </a:p>
+                  </a:txBody>
+                  <a:tcPr>
+                    <a:lnL w="12700" cap="flat" cmpd="sng" algn="ctr">
+                      <a:noFill/>
+                      <a:prstDash val="solid"/>
+                      <a:round/>
+                      <a:headEnd type="none" w="med" len="med"/>
+                      <a:tailEnd type="none" w="med" len="med"/>
+                    </a:lnL>
+                    <a:lnR w="12700" cap="flat" cmpd="sng" algn="ctr">
+                      <a:noFill/>
+                      <a:prstDash val="solid"/>
+                      <a:round/>
+                      <a:headEnd type="none" w="med" len="med"/>
+                      <a:tailEnd type="none" w="med" len="med"/>
+                    </a:lnR>
+                    <a:lnT w="12700" cap="flat" cmpd="sng" algn="ctr">
+                      <a:noFill/>
+                      <a:prstDash val="solid"/>
+                      <a:round/>
+                      <a:headEnd type="none" w="med" len="med"/>
+                      <a:tailEnd type="none" w="med" len="med"/>
+                    </a:lnT>
+                    <a:lnB w="12700" cap="flat" cmpd="sng" algn="ctr">
+                      <a:noFill/>
+                      <a:prstDash val="solid"/>
+                      <a:round/>
+                      <a:headEnd type="none" w="med" len="med"/>
+                      <a:tailEnd type="none" w="med" len="med"/>
+                    </a:lnB>
+                    <a:lnTlToBr w="12700" cmpd="sng">
+                      <a:noFill/>
+                      <a:prstDash val="solid"/>
+                    </a:lnTlToBr>
+                    <a:lnBlToTr w="12700" cmpd="sng">
+                      <a:noFill/>
+                      <a:prstDash val="solid"/>
+                    </a:lnBlToTr>
+                  </a:tcPr>
+                </a:tc>
+                <a:tc>
+                  <a:txBody>
+                    <a:bodyPr/>
+                    <a:lstStyle/>
+                    <a:p>
+                      <a:pPr algn="l"/>
+                      <a:r>
+                        <a:rPr lang="en-CA" sz="2800" i="1" dirty="0"/>
+                        <a:t>Software Engineering</a:t>
+                      </a:r>
+                      <a:endParaRPr lang="en-US" sz="2800" i="1" dirty="0"/>
+                    </a:p>
+                  </a:txBody>
+                  <a:tcPr>
+                    <a:lnL w="12700" cap="flat" cmpd="sng" algn="ctr">
+                      <a:noFill/>
+                      <a:prstDash val="solid"/>
+                      <a:round/>
+                      <a:headEnd type="none" w="med" len="med"/>
+                      <a:tailEnd type="none" w="med" len="med"/>
+                    </a:lnL>
+                    <a:lnR w="12700" cap="flat" cmpd="sng" algn="ctr">
+                      <a:noFill/>
+                      <a:prstDash val="solid"/>
+                      <a:round/>
+                      <a:headEnd type="none" w="med" len="med"/>
+                      <a:tailEnd type="none" w="med" len="med"/>
+                    </a:lnR>
+                    <a:lnT w="12700" cap="flat" cmpd="sng" algn="ctr">
+                      <a:noFill/>
+                      <a:prstDash val="solid"/>
+                      <a:round/>
+                      <a:headEnd type="none" w="med" len="med"/>
+                      <a:tailEnd type="none" w="med" len="med"/>
+                    </a:lnT>
+                    <a:lnB w="12700" cap="flat" cmpd="sng" algn="ctr">
+                      <a:noFill/>
+                      <a:prstDash val="solid"/>
+                      <a:round/>
+                      <a:headEnd type="none" w="med" len="med"/>
+                      <a:tailEnd type="none" w="med" len="med"/>
+                    </a:lnB>
+                    <a:lnTlToBr w="12700" cmpd="sng">
+                      <a:noFill/>
+                      <a:prstDash val="solid"/>
+                    </a:lnTlToBr>
+                    <a:lnBlToTr w="12700" cmpd="sng">
+                      <a:noFill/>
+                      <a:prstDash val="solid"/>
+                    </a:lnBlToTr>
+                  </a:tcPr>
+                </a:tc>
+                <a:extLst>
+                  <a:ext uri="{0D108BD9-81ED-4DB2-BD59-A6C34878D82A}">
+                    <a16:rowId xmlns:a16="http://schemas.microsoft.com/office/drawing/2014/main" val="3306447196"/>
+                  </a:ext>
+                </a:extLst>
+              </a:tr>
+              <a:tr h="370840">
+                <a:tc>
+                  <a:txBody>
+                    <a:bodyPr/>
+                    <a:lstStyle/>
+                    <a:p>
+                      <a:pPr algn="r"/>
+                      <a:r>
+                        <a:rPr lang="en-CA" sz="2800" dirty="0">
+                          <a:solidFill>
+                            <a:srgbClr val="2A1A00"/>
+                          </a:solidFill>
+                        </a:rPr>
+                        <a:t>Radhika Sharma</a:t>
+                      </a:r>
+                      <a:endParaRPr lang="en-US" sz="2800" dirty="0"/>
+                    </a:p>
+                  </a:txBody>
+                  <a:tcPr>
+                    <a:lnL w="12700" cap="flat" cmpd="sng" algn="ctr">
+                      <a:noFill/>
+                      <a:prstDash val="solid"/>
+                      <a:round/>
+                      <a:headEnd type="none" w="med" len="med"/>
+                      <a:tailEnd type="none" w="med" len="med"/>
+                    </a:lnL>
+                    <a:lnR w="12700" cap="flat" cmpd="sng" algn="ctr">
+                      <a:noFill/>
+                      <a:prstDash val="solid"/>
+                      <a:round/>
+                      <a:headEnd type="none" w="med" len="med"/>
+                      <a:tailEnd type="none" w="med" len="med"/>
+                    </a:lnR>
+                    <a:lnT w="12700" cap="flat" cmpd="sng" algn="ctr">
+                      <a:noFill/>
+                      <a:prstDash val="solid"/>
+                      <a:round/>
+                      <a:headEnd type="none" w="med" len="med"/>
+                      <a:tailEnd type="none" w="med" len="med"/>
+                    </a:lnT>
+                    <a:lnB w="12700" cap="flat" cmpd="sng" algn="ctr">
+                      <a:noFill/>
+                      <a:prstDash val="solid"/>
+                      <a:round/>
+                      <a:headEnd type="none" w="med" len="med"/>
+                      <a:tailEnd type="none" w="med" len="med"/>
+                    </a:lnB>
+                    <a:lnTlToBr w="12700" cmpd="sng">
+                      <a:noFill/>
+                      <a:prstDash val="solid"/>
+                    </a:lnTlToBr>
+                    <a:lnBlToTr w="12700" cmpd="sng">
+                      <a:noFill/>
+                      <a:prstDash val="solid"/>
+                    </a:lnBlToTr>
+                  </a:tcPr>
+                </a:tc>
+                <a:tc>
+                  <a:txBody>
+                    <a:bodyPr/>
+                    <a:lstStyle/>
+                    <a:p>
+                      <a:pPr algn="ctr"/>
+                      <a:r>
+                        <a:rPr lang="en-CA" sz="2800" dirty="0"/>
+                        <a:t>-</a:t>
+                      </a:r>
+                      <a:endParaRPr lang="en-US" sz="2800" dirty="0"/>
+                    </a:p>
+                  </a:txBody>
+                  <a:tcPr>
+                    <a:lnL w="12700" cap="flat" cmpd="sng" algn="ctr">
+                      <a:noFill/>
+                      <a:prstDash val="solid"/>
+                      <a:round/>
+                      <a:headEnd type="none" w="med" len="med"/>
+                      <a:tailEnd type="none" w="med" len="med"/>
+                    </a:lnL>
+                    <a:lnR w="12700" cap="flat" cmpd="sng" algn="ctr">
+                      <a:noFill/>
+                      <a:prstDash val="solid"/>
+                      <a:round/>
+                      <a:headEnd type="none" w="med" len="med"/>
+                      <a:tailEnd type="none" w="med" len="med"/>
+                    </a:lnR>
+                    <a:lnT w="12700" cap="flat" cmpd="sng" algn="ctr">
+                      <a:noFill/>
+                      <a:prstDash val="solid"/>
+                      <a:round/>
+                      <a:headEnd type="none" w="med" len="med"/>
+                      <a:tailEnd type="none" w="med" len="med"/>
+                    </a:lnT>
+                    <a:lnB w="12700" cap="flat" cmpd="sng" algn="ctr">
+                      <a:noFill/>
+                      <a:prstDash val="solid"/>
+                      <a:round/>
+                      <a:headEnd type="none" w="med" len="med"/>
+                      <a:tailEnd type="none" w="med" len="med"/>
+                    </a:lnB>
+                    <a:lnTlToBr w="12700" cmpd="sng">
+                      <a:noFill/>
+                      <a:prstDash val="solid"/>
+                    </a:lnTlToBr>
+                    <a:lnBlToTr w="12700" cmpd="sng">
+                      <a:noFill/>
+                      <a:prstDash val="solid"/>
+                    </a:lnBlToTr>
+                  </a:tcPr>
+                </a:tc>
+                <a:tc>
+                  <a:txBody>
+                    <a:bodyPr/>
+                    <a:lstStyle/>
+                    <a:p>
+                      <a:pPr algn="l"/>
+                      <a:r>
+                        <a:rPr lang="en-CA" sz="2800" i="1" dirty="0"/>
+                        <a:t>Software Engineering – Embedded Systems</a:t>
+                      </a:r>
+                      <a:endParaRPr lang="en-US" sz="2800" i="1" dirty="0"/>
+                    </a:p>
+                  </a:txBody>
+                  <a:tcPr>
+                    <a:lnL w="12700" cap="flat" cmpd="sng" algn="ctr">
+                      <a:noFill/>
+                      <a:prstDash val="solid"/>
+                      <a:round/>
+                      <a:headEnd type="none" w="med" len="med"/>
+                      <a:tailEnd type="none" w="med" len="med"/>
+                    </a:lnL>
+                    <a:lnR w="12700" cap="flat" cmpd="sng" algn="ctr">
+                      <a:noFill/>
+                      <a:prstDash val="solid"/>
+                      <a:round/>
+                      <a:headEnd type="none" w="med" len="med"/>
+                      <a:tailEnd type="none" w="med" len="med"/>
+                    </a:lnR>
+                    <a:lnT w="12700" cap="flat" cmpd="sng" algn="ctr">
+                      <a:noFill/>
+                      <a:prstDash val="solid"/>
+                      <a:round/>
+                      <a:headEnd type="none" w="med" len="med"/>
+                      <a:tailEnd type="none" w="med" len="med"/>
+                    </a:lnT>
+                    <a:lnB w="12700" cap="flat" cmpd="sng" algn="ctr">
+                      <a:noFill/>
+                      <a:prstDash val="solid"/>
+                      <a:round/>
+                      <a:headEnd type="none" w="med" len="med"/>
+                      <a:tailEnd type="none" w="med" len="med"/>
+                    </a:lnB>
+                    <a:lnTlToBr w="12700" cmpd="sng">
+                      <a:noFill/>
+                      <a:prstDash val="solid"/>
+                    </a:lnTlToBr>
+                    <a:lnBlToTr w="12700" cmpd="sng">
+                      <a:noFill/>
+                      <a:prstDash val="solid"/>
+                    </a:lnBlToTr>
+                  </a:tcPr>
+                </a:tc>
+                <a:extLst>
+                  <a:ext uri="{0D108BD9-81ED-4DB2-BD59-A6C34878D82A}">
+                    <a16:rowId xmlns:a16="http://schemas.microsoft.com/office/drawing/2014/main" val="2448494909"/>
+                  </a:ext>
+                </a:extLst>
+              </a:tr>
+            </a:tbl>
+          </a:graphicData>
+        </a:graphic>
+      </p:graphicFrame>
+    </p:spTree>
+    <p:extLst>
+      <p:ext uri="{BB962C8B-B14F-4D97-AF65-F5344CB8AC3E}">
+        <p14:creationId xmlns:p14="http://schemas.microsoft.com/office/powerpoint/2010/main" val="1390596968"/>
+      </p:ext>
+    </p:extLst>
+  </p:cSld>
+  <p:clrMapOvr>
+    <a:masterClrMapping/>
+  </p:clrMapOvr>
+</p:sld>
+</file>
+
+<file path=ppt/slides/slide20.xml><?xml version="1.0" encoding="utf-8"?>
+<p:sld xmlns:a="http://schemas.openxmlformats.org/drawingml/2006/main" xmlns:r="http://schemas.openxmlformats.org/officeDocument/2006/relationships" xmlns:p="http://schemas.openxmlformats.org/presentationml/2006/main">
+  <p:cSld>
+    <p:spTree>
+      <p:nvGrpSpPr>
+        <p:cNvPr id="1" name=""/>
+        <p:cNvGrpSpPr/>
+        <p:nvPr/>
+      </p:nvGrpSpPr>
+      <p:grpSpPr>
+        <a:xfrm>
+          <a:off x="0" y="0"/>
+          <a:ext cx="0" cy="0"/>
+          <a:chOff x="0" y="0"/>
+          <a:chExt cx="0" cy="0"/>
+        </a:xfrm>
+      </p:grpSpPr>
+      <p:sp>
+        <p:nvSpPr>
           <p:cNvPr id="10" name="Rectangle 6"/>
           <p:cNvSpPr>
             <a:spLocks noGrp="1" noRot="1" noChangeAspect="1" noMove="1" noResize="1" noEditPoints="1" noAdjustHandles="1" noChangeArrowheads="1" noChangeShapeType="1" noTextEdit="1"/>
@@ -11504,7 +13464,7 @@
           <p:nvPr>
             <p:extLst>
               <p:ext uri="{386F3935-93C4-4BCD-93E2-E3B085C9AB24}">
-                <p16:designElem xmlns:p16="http://schemas.microsoft.com/office/powerpoint/2015/main" xmlns="" val="1"/>
+                <p16:designElem xmlns:p16="http://schemas.microsoft.com/office/powerpoint/2015/main" val="1"/>
               </p:ext>
             </p:extLst>
           </p:nvPr>
@@ -11558,7 +13518,7 @@
           <p:nvPr>
             <p:extLst>
               <p:ext uri="{386F3935-93C4-4BCD-93E2-E3B085C9AB24}">
-                <p16:designElem xmlns:p16="http://schemas.microsoft.com/office/powerpoint/2015/main" xmlns="" val="1"/>
+                <p16:designElem xmlns:p16="http://schemas.microsoft.com/office/powerpoint/2015/main" val="1"/>
               </p:ext>
             </p:extLst>
           </p:nvPr>
@@ -11651,7 +13611,7 @@
           <p:nvPr>
             <p:extLst>
               <p:ext uri="{386F3935-93C4-4BCD-93E2-E3B085C9AB24}">
-                <p16:designElem xmlns:p16="http://schemas.microsoft.com/office/powerpoint/2015/main" xmlns="" val="1"/>
+                <p16:designElem xmlns:p16="http://schemas.microsoft.com/office/powerpoint/2015/main" val="1"/>
               </p:ext>
             </p:extLst>
           </p:nvPr>
@@ -12456,1166 +14416,6 @@
   <p:clrMapOvr>
     <a:masterClrMapping/>
   </p:clrMapOvr>
-</p:sld>
-</file>
-
-<file path=ppt/slides/slide2.xml><?xml version="1.0" encoding="utf-8"?>
-<p:sld xmlns:a="http://schemas.openxmlformats.org/drawingml/2006/main" xmlns:r="http://schemas.openxmlformats.org/officeDocument/2006/relationships" xmlns:p="http://schemas.openxmlformats.org/presentationml/2006/main">
-  <p:cSld>
-    <p:spTree>
-      <p:nvGrpSpPr>
-        <p:cNvPr id="1" name=""/>
-        <p:cNvGrpSpPr/>
-        <p:nvPr/>
-      </p:nvGrpSpPr>
-      <p:grpSpPr>
-        <a:xfrm>
-          <a:off x="0" y="0"/>
-          <a:ext cx="0" cy="0"/>
-          <a:chOff x="0" y="0"/>
-          <a:chExt cx="0" cy="0"/>
-        </a:xfrm>
-      </p:grpSpPr>
-      <p:sp>
-        <p:nvSpPr>
-          <p:cNvPr id="2" name="Title 1"/>
-          <p:cNvSpPr>
-            <a:spLocks noGrp="1"/>
-          </p:cNvSpPr>
-          <p:nvPr>
-            <p:ph type="title"/>
-          </p:nvPr>
-        </p:nvSpPr>
-        <p:spPr>
-          <a:xfrm>
-            <a:off x="1244303" y="399942"/>
-            <a:ext cx="10178322" cy="1053126"/>
-          </a:xfrm>
-        </p:spPr>
-        <p:txBody>
-          <a:bodyPr>
-            <a:noAutofit/>
-          </a:bodyPr>
-          <a:lstStyle/>
-          <a:p>
-            <a:pPr>
-              <a:lnSpc>
-                <a:spcPct val="100000"/>
-              </a:lnSpc>
-            </a:pPr>
-            <a:r>
-              <a:rPr lang="en-CA" sz="7200" dirty="0"/>
-              <a:t>The Team</a:t>
-            </a:r>
-            <a:endParaRPr lang="en-US" sz="7200" dirty="0"/>
-          </a:p>
-        </p:txBody>
-      </p:sp>
-      <p:graphicFrame>
-        <p:nvGraphicFramePr>
-          <p:cNvPr id="4" name="Content Placeholder 3"/>
-          <p:cNvGraphicFramePr>
-            <a:graphicFrameLocks noGrp="1"/>
-          </p:cNvGraphicFramePr>
-          <p:nvPr>
-            <p:ph idx="1"/>
-            <p:extLst>
-              <p:ext uri="{D42A27DB-BD31-4B8C-83A1-F6EECF244321}">
-                <p14:modId xmlns:p14="http://schemas.microsoft.com/office/powerpoint/2010/main" val="1033927486"/>
-              </p:ext>
-            </p:extLst>
-          </p:nvPr>
-        </p:nvGraphicFramePr>
-        <p:xfrm>
-          <a:off x="736451" y="2266335"/>
-          <a:ext cx="11346427" cy="3108960"/>
-        </p:xfrm>
-        <a:graphic>
-          <a:graphicData uri="http://schemas.openxmlformats.org/drawingml/2006/table">
-            <a:tbl>
-              <a:tblPr firstRow="1" bandRow="1">
-                <a:tableStyleId>{2D5ABB26-0587-4C30-8999-92F81FD0307C}</a:tableStyleId>
-              </a:tblPr>
-              <a:tblGrid>
-                <a:gridCol w="3500285">
-                  <a:extLst>
-                    <a:ext uri="{9D8B030D-6E8A-4147-A177-3AD203B41FA5}">
-                      <a16:colId xmlns:a16="http://schemas.microsoft.com/office/drawing/2014/main" xmlns="" val="2565215050"/>
-                    </a:ext>
-                  </a:extLst>
-                </a:gridCol>
-                <a:gridCol w="394258">
-                  <a:extLst>
-                    <a:ext uri="{9D8B030D-6E8A-4147-A177-3AD203B41FA5}">
-                      <a16:colId xmlns:a16="http://schemas.microsoft.com/office/drawing/2014/main" xmlns="" val="3279567016"/>
-                    </a:ext>
-                  </a:extLst>
-                </a:gridCol>
-                <a:gridCol w="7451884">
-                  <a:extLst>
-                    <a:ext uri="{9D8B030D-6E8A-4147-A177-3AD203B41FA5}">
-                      <a16:colId xmlns:a16="http://schemas.microsoft.com/office/drawing/2014/main" xmlns="" val="3702030157"/>
-                    </a:ext>
-                  </a:extLst>
-                </a:gridCol>
-              </a:tblGrid>
-              <a:tr h="370840">
-                <a:tc>
-                  <a:txBody>
-                    <a:bodyPr/>
-                    <a:lstStyle/>
-                    <a:p>
-                      <a:pPr algn="r"/>
-                      <a:r>
-                        <a:rPr lang="en-CA" sz="2800" dirty="0"/>
-                        <a:t>Zachary Bazen </a:t>
-                      </a:r>
-                      <a:endParaRPr lang="en-US" sz="2800" dirty="0"/>
-                    </a:p>
-                  </a:txBody>
-                  <a:tcPr>
-                    <a:lnL w="12700" cap="flat" cmpd="sng" algn="ctr">
-                      <a:noFill/>
-                      <a:prstDash val="solid"/>
-                      <a:round/>
-                      <a:headEnd type="none" w="med" len="med"/>
-                      <a:tailEnd type="none" w="med" len="med"/>
-                    </a:lnL>
-                    <a:lnR w="12700" cap="flat" cmpd="sng" algn="ctr">
-                      <a:noFill/>
-                      <a:prstDash val="solid"/>
-                      <a:round/>
-                      <a:headEnd type="none" w="med" len="med"/>
-                      <a:tailEnd type="none" w="med" len="med"/>
-                    </a:lnR>
-                    <a:lnT w="12700" cap="flat" cmpd="sng" algn="ctr">
-                      <a:noFill/>
-                      <a:prstDash val="solid"/>
-                      <a:round/>
-                      <a:headEnd type="none" w="med" len="med"/>
-                      <a:tailEnd type="none" w="med" len="med"/>
-                    </a:lnT>
-                    <a:lnB w="12700" cap="flat" cmpd="sng" algn="ctr">
-                      <a:noFill/>
-                      <a:prstDash val="solid"/>
-                      <a:round/>
-                      <a:headEnd type="none" w="med" len="med"/>
-                      <a:tailEnd type="none" w="med" len="med"/>
-                    </a:lnB>
-                    <a:lnTlToBr w="12700" cmpd="sng">
-                      <a:noFill/>
-                      <a:prstDash val="solid"/>
-                    </a:lnTlToBr>
-                    <a:lnBlToTr w="12700" cmpd="sng">
-                      <a:noFill/>
-                      <a:prstDash val="solid"/>
-                    </a:lnBlToTr>
-                  </a:tcPr>
-                </a:tc>
-                <a:tc>
-                  <a:txBody>
-                    <a:bodyPr/>
-                    <a:lstStyle/>
-                    <a:p>
-                      <a:pPr algn="ctr"/>
-                      <a:r>
-                        <a:rPr lang="en-CA" sz="2800" dirty="0"/>
-                        <a:t>-</a:t>
-                      </a:r>
-                      <a:endParaRPr lang="en-US" sz="2800" dirty="0"/>
-                    </a:p>
-                  </a:txBody>
-                  <a:tcPr>
-                    <a:lnL w="12700" cap="flat" cmpd="sng" algn="ctr">
-                      <a:noFill/>
-                      <a:prstDash val="solid"/>
-                      <a:round/>
-                      <a:headEnd type="none" w="med" len="med"/>
-                      <a:tailEnd type="none" w="med" len="med"/>
-                    </a:lnL>
-                    <a:lnR w="12700" cap="flat" cmpd="sng" algn="ctr">
-                      <a:noFill/>
-                      <a:prstDash val="solid"/>
-                      <a:round/>
-                      <a:headEnd type="none" w="med" len="med"/>
-                      <a:tailEnd type="none" w="med" len="med"/>
-                    </a:lnR>
-                    <a:lnT w="12700" cap="flat" cmpd="sng" algn="ctr">
-                      <a:noFill/>
-                      <a:prstDash val="solid"/>
-                      <a:round/>
-                      <a:headEnd type="none" w="med" len="med"/>
-                      <a:tailEnd type="none" w="med" len="med"/>
-                    </a:lnT>
-                    <a:lnB w="12700" cap="flat" cmpd="sng" algn="ctr">
-                      <a:noFill/>
-                      <a:prstDash val="solid"/>
-                      <a:round/>
-                      <a:headEnd type="none" w="med" len="med"/>
-                      <a:tailEnd type="none" w="med" len="med"/>
-                    </a:lnB>
-                    <a:lnTlToBr w="12700" cmpd="sng">
-                      <a:noFill/>
-                      <a:prstDash val="solid"/>
-                    </a:lnTlToBr>
-                    <a:lnBlToTr w="12700" cmpd="sng">
-                      <a:noFill/>
-                      <a:prstDash val="solid"/>
-                    </a:lnBlToTr>
-                  </a:tcPr>
-                </a:tc>
-                <a:tc>
-                  <a:txBody>
-                    <a:bodyPr/>
-                    <a:lstStyle/>
-                    <a:p>
-                      <a:pPr algn="l"/>
-                      <a:r>
-                        <a:rPr lang="en-CA" sz="2800" i="1" dirty="0"/>
-                        <a:t>Software Engineering</a:t>
-                      </a:r>
-                      <a:r>
-                        <a:rPr lang="en-CA" sz="2800" i="1" baseline="0" dirty="0"/>
-                        <a:t> </a:t>
-                      </a:r>
-                      <a:endParaRPr lang="en-US" sz="2800" i="1" dirty="0"/>
-                    </a:p>
-                  </a:txBody>
-                  <a:tcPr>
-                    <a:lnL w="12700" cap="flat" cmpd="sng" algn="ctr">
-                      <a:noFill/>
-                      <a:prstDash val="solid"/>
-                      <a:round/>
-                      <a:headEnd type="none" w="med" len="med"/>
-                      <a:tailEnd type="none" w="med" len="med"/>
-                    </a:lnL>
-                    <a:lnR w="12700" cap="flat" cmpd="sng" algn="ctr">
-                      <a:noFill/>
-                      <a:prstDash val="solid"/>
-                      <a:round/>
-                      <a:headEnd type="none" w="med" len="med"/>
-                      <a:tailEnd type="none" w="med" len="med"/>
-                    </a:lnR>
-                    <a:lnT w="12700" cap="flat" cmpd="sng" algn="ctr">
-                      <a:noFill/>
-                      <a:prstDash val="solid"/>
-                      <a:round/>
-                      <a:headEnd type="none" w="med" len="med"/>
-                      <a:tailEnd type="none" w="med" len="med"/>
-                    </a:lnT>
-                    <a:lnB w="12700" cap="flat" cmpd="sng" algn="ctr">
-                      <a:noFill/>
-                      <a:prstDash val="solid"/>
-                      <a:round/>
-                      <a:headEnd type="none" w="med" len="med"/>
-                      <a:tailEnd type="none" w="med" len="med"/>
-                    </a:lnB>
-                    <a:lnTlToBr w="12700" cmpd="sng">
-                      <a:noFill/>
-                      <a:prstDash val="solid"/>
-                    </a:lnTlToBr>
-                    <a:lnBlToTr w="12700" cmpd="sng">
-                      <a:noFill/>
-                      <a:prstDash val="solid"/>
-                    </a:lnBlToTr>
-                  </a:tcPr>
-                </a:tc>
-                <a:extLst>
-                  <a:ext uri="{0D108BD9-81ED-4DB2-BD59-A6C34878D82A}">
-                    <a16:rowId xmlns:a16="http://schemas.microsoft.com/office/drawing/2014/main" xmlns="" val="3950718333"/>
-                  </a:ext>
-                </a:extLst>
-              </a:tr>
-              <a:tr h="370840">
-                <a:tc>
-                  <a:txBody>
-                    <a:bodyPr/>
-                    <a:lstStyle/>
-                    <a:p>
-                      <a:pPr algn="r"/>
-                      <a:r>
-                        <a:rPr lang="en-CA" sz="2800" dirty="0">
-                          <a:solidFill>
-                            <a:srgbClr val="2A1A00"/>
-                          </a:solidFill>
-                        </a:rPr>
-                        <a:t>Jean </a:t>
-                      </a:r>
-                      <a:r>
-                        <a:rPr lang="en-US" sz="2800" dirty="0">
-                          <a:solidFill>
-                            <a:srgbClr val="2A1A00"/>
-                          </a:solidFill>
-                        </a:rPr>
-                        <a:t>Lucas Ferreira</a:t>
-                      </a:r>
-                      <a:r>
-                        <a:rPr lang="en-CA" sz="2800" dirty="0">
-                          <a:solidFill>
-                            <a:srgbClr val="2A1A00"/>
-                          </a:solidFill>
-                        </a:rPr>
-                        <a:t> </a:t>
-                      </a:r>
-                      <a:endParaRPr lang="en-US" sz="2800" dirty="0"/>
-                    </a:p>
-                  </a:txBody>
-                  <a:tcPr>
-                    <a:lnL w="12700" cap="flat" cmpd="sng" algn="ctr">
-                      <a:noFill/>
-                      <a:prstDash val="solid"/>
-                      <a:round/>
-                      <a:headEnd type="none" w="med" len="med"/>
-                      <a:tailEnd type="none" w="med" len="med"/>
-                    </a:lnL>
-                    <a:lnR w="12700" cap="flat" cmpd="sng" algn="ctr">
-                      <a:noFill/>
-                      <a:prstDash val="solid"/>
-                      <a:round/>
-                      <a:headEnd type="none" w="med" len="med"/>
-                      <a:tailEnd type="none" w="med" len="med"/>
-                    </a:lnR>
-                    <a:lnT w="12700" cap="flat" cmpd="sng" algn="ctr">
-                      <a:noFill/>
-                      <a:prstDash val="solid"/>
-                      <a:round/>
-                      <a:headEnd type="none" w="med" len="med"/>
-                      <a:tailEnd type="none" w="med" len="med"/>
-                    </a:lnT>
-                    <a:lnB w="12700" cap="flat" cmpd="sng" algn="ctr">
-                      <a:noFill/>
-                      <a:prstDash val="solid"/>
-                      <a:round/>
-                      <a:headEnd type="none" w="med" len="med"/>
-                      <a:tailEnd type="none" w="med" len="med"/>
-                    </a:lnB>
-                    <a:lnTlToBr w="12700" cmpd="sng">
-                      <a:noFill/>
-                      <a:prstDash val="solid"/>
-                    </a:lnTlToBr>
-                    <a:lnBlToTr w="12700" cmpd="sng">
-                      <a:noFill/>
-                      <a:prstDash val="solid"/>
-                    </a:lnBlToTr>
-                  </a:tcPr>
-                </a:tc>
-                <a:tc>
-                  <a:txBody>
-                    <a:bodyPr/>
-                    <a:lstStyle/>
-                    <a:p>
-                      <a:pPr algn="ctr"/>
-                      <a:r>
-                        <a:rPr lang="en-CA" sz="2800" dirty="0"/>
-                        <a:t>-</a:t>
-                      </a:r>
-                      <a:endParaRPr lang="en-US" sz="2800" dirty="0"/>
-                    </a:p>
-                  </a:txBody>
-                  <a:tcPr>
-                    <a:lnL w="12700" cap="flat" cmpd="sng" algn="ctr">
-                      <a:noFill/>
-                      <a:prstDash val="solid"/>
-                      <a:round/>
-                      <a:headEnd type="none" w="med" len="med"/>
-                      <a:tailEnd type="none" w="med" len="med"/>
-                    </a:lnL>
-                    <a:lnR w="12700" cap="flat" cmpd="sng" algn="ctr">
-                      <a:noFill/>
-                      <a:prstDash val="solid"/>
-                      <a:round/>
-                      <a:headEnd type="none" w="med" len="med"/>
-                      <a:tailEnd type="none" w="med" len="med"/>
-                    </a:lnR>
-                    <a:lnT w="12700" cap="flat" cmpd="sng" algn="ctr">
-                      <a:noFill/>
-                      <a:prstDash val="solid"/>
-                      <a:round/>
-                      <a:headEnd type="none" w="med" len="med"/>
-                      <a:tailEnd type="none" w="med" len="med"/>
-                    </a:lnT>
-                    <a:lnB w="12700" cap="flat" cmpd="sng" algn="ctr">
-                      <a:noFill/>
-                      <a:prstDash val="solid"/>
-                      <a:round/>
-                      <a:headEnd type="none" w="med" len="med"/>
-                      <a:tailEnd type="none" w="med" len="med"/>
-                    </a:lnB>
-                    <a:lnTlToBr w="12700" cmpd="sng">
-                      <a:noFill/>
-                      <a:prstDash val="solid"/>
-                    </a:lnTlToBr>
-                    <a:lnBlToTr w="12700" cmpd="sng">
-                      <a:noFill/>
-                      <a:prstDash val="solid"/>
-                    </a:lnBlToTr>
-                  </a:tcPr>
-                </a:tc>
-                <a:tc>
-                  <a:txBody>
-                    <a:bodyPr/>
-                    <a:lstStyle/>
-                    <a:p>
-                      <a:pPr marL="0" marR="0" lvl="0" indent="0" algn="l" defTabSz="914400" rtl="0" eaLnBrk="1" fontAlgn="auto" latinLnBrk="0" hangingPunct="1">
-                        <a:lnSpc>
-                          <a:spcPct val="100000"/>
-                        </a:lnSpc>
-                        <a:spcBef>
-                          <a:spcPts val="0"/>
-                        </a:spcBef>
-                        <a:spcAft>
-                          <a:spcPts val="0"/>
-                        </a:spcAft>
-                        <a:buClrTx/>
-                        <a:buSzTx/>
-                        <a:buFontTx/>
-                        <a:buNone/>
-                        <a:tabLst/>
-                        <a:defRPr/>
-                      </a:pPr>
-                      <a:r>
-                        <a:rPr lang="en-CA" sz="2800" i="1" dirty="0"/>
-                        <a:t>Software Engineering</a:t>
-                      </a:r>
-                      <a:r>
-                        <a:rPr lang="en-CA" sz="2800" i="1" baseline="0" dirty="0"/>
-                        <a:t> </a:t>
-                      </a:r>
-                      <a:endParaRPr lang="en-US" sz="2800" i="1" dirty="0"/>
-                    </a:p>
-                  </a:txBody>
-                  <a:tcPr>
-                    <a:lnL w="12700" cap="flat" cmpd="sng" algn="ctr">
-                      <a:noFill/>
-                      <a:prstDash val="solid"/>
-                      <a:round/>
-                      <a:headEnd type="none" w="med" len="med"/>
-                      <a:tailEnd type="none" w="med" len="med"/>
-                    </a:lnL>
-                    <a:lnR w="12700" cap="flat" cmpd="sng" algn="ctr">
-                      <a:noFill/>
-                      <a:prstDash val="solid"/>
-                      <a:round/>
-                      <a:headEnd type="none" w="med" len="med"/>
-                      <a:tailEnd type="none" w="med" len="med"/>
-                    </a:lnR>
-                    <a:lnT w="12700" cap="flat" cmpd="sng" algn="ctr">
-                      <a:noFill/>
-                      <a:prstDash val="solid"/>
-                      <a:round/>
-                      <a:headEnd type="none" w="med" len="med"/>
-                      <a:tailEnd type="none" w="med" len="med"/>
-                    </a:lnT>
-                    <a:lnB w="12700" cap="flat" cmpd="sng" algn="ctr">
-                      <a:noFill/>
-                      <a:prstDash val="solid"/>
-                      <a:round/>
-                      <a:headEnd type="none" w="med" len="med"/>
-                      <a:tailEnd type="none" w="med" len="med"/>
-                    </a:lnB>
-                    <a:lnTlToBr w="12700" cmpd="sng">
-                      <a:noFill/>
-                      <a:prstDash val="solid"/>
-                    </a:lnTlToBr>
-                    <a:lnBlToTr w="12700" cmpd="sng">
-                      <a:noFill/>
-                      <a:prstDash val="solid"/>
-                    </a:lnBlToTr>
-                  </a:tcPr>
-                </a:tc>
-                <a:extLst>
-                  <a:ext uri="{0D108BD9-81ED-4DB2-BD59-A6C34878D82A}">
-                    <a16:rowId xmlns:a16="http://schemas.microsoft.com/office/drawing/2014/main" xmlns="" val="2377837653"/>
-                  </a:ext>
-                </a:extLst>
-              </a:tr>
-              <a:tr h="370840">
-                <a:tc>
-                  <a:txBody>
-                    <a:bodyPr/>
-                    <a:lstStyle/>
-                    <a:p>
-                      <a:pPr algn="r"/>
-                      <a:r>
-                        <a:rPr lang="en-US" sz="2800" dirty="0"/>
-                        <a:t>Alexander Jackson </a:t>
-                      </a:r>
-                    </a:p>
-                  </a:txBody>
-                  <a:tcPr>
-                    <a:lnL w="12700" cap="flat" cmpd="sng" algn="ctr">
-                      <a:noFill/>
-                      <a:prstDash val="solid"/>
-                      <a:round/>
-                      <a:headEnd type="none" w="med" len="med"/>
-                      <a:tailEnd type="none" w="med" len="med"/>
-                    </a:lnL>
-                    <a:lnR w="12700" cap="flat" cmpd="sng" algn="ctr">
-                      <a:noFill/>
-                      <a:prstDash val="solid"/>
-                      <a:round/>
-                      <a:headEnd type="none" w="med" len="med"/>
-                      <a:tailEnd type="none" w="med" len="med"/>
-                    </a:lnR>
-                    <a:lnT w="12700" cap="flat" cmpd="sng" algn="ctr">
-                      <a:noFill/>
-                      <a:prstDash val="solid"/>
-                      <a:round/>
-                      <a:headEnd type="none" w="med" len="med"/>
-                      <a:tailEnd type="none" w="med" len="med"/>
-                    </a:lnT>
-                    <a:lnB w="12700" cap="flat" cmpd="sng" algn="ctr">
-                      <a:noFill/>
-                      <a:prstDash val="solid"/>
-                      <a:round/>
-                      <a:headEnd type="none" w="med" len="med"/>
-                      <a:tailEnd type="none" w="med" len="med"/>
-                    </a:lnB>
-                    <a:lnTlToBr w="12700" cmpd="sng">
-                      <a:noFill/>
-                      <a:prstDash val="solid"/>
-                    </a:lnTlToBr>
-                    <a:lnBlToTr w="12700" cmpd="sng">
-                      <a:noFill/>
-                      <a:prstDash val="solid"/>
-                    </a:lnBlToTr>
-                  </a:tcPr>
-                </a:tc>
-                <a:tc>
-                  <a:txBody>
-                    <a:bodyPr/>
-                    <a:lstStyle/>
-                    <a:p>
-                      <a:pPr algn="ctr"/>
-                      <a:r>
-                        <a:rPr lang="en-CA" sz="2800" dirty="0"/>
-                        <a:t>-</a:t>
-                      </a:r>
-                      <a:endParaRPr lang="en-US" sz="2800" dirty="0"/>
-                    </a:p>
-                  </a:txBody>
-                  <a:tcPr>
-                    <a:lnL w="12700" cap="flat" cmpd="sng" algn="ctr">
-                      <a:noFill/>
-                      <a:prstDash val="solid"/>
-                      <a:round/>
-                      <a:headEnd type="none" w="med" len="med"/>
-                      <a:tailEnd type="none" w="med" len="med"/>
-                    </a:lnL>
-                    <a:lnR w="12700" cap="flat" cmpd="sng" algn="ctr">
-                      <a:noFill/>
-                      <a:prstDash val="solid"/>
-                      <a:round/>
-                      <a:headEnd type="none" w="med" len="med"/>
-                      <a:tailEnd type="none" w="med" len="med"/>
-                    </a:lnR>
-                    <a:lnT w="12700" cap="flat" cmpd="sng" algn="ctr">
-                      <a:noFill/>
-                      <a:prstDash val="solid"/>
-                      <a:round/>
-                      <a:headEnd type="none" w="med" len="med"/>
-                      <a:tailEnd type="none" w="med" len="med"/>
-                    </a:lnT>
-                    <a:lnB w="12700" cap="flat" cmpd="sng" algn="ctr">
-                      <a:noFill/>
-                      <a:prstDash val="solid"/>
-                      <a:round/>
-                      <a:headEnd type="none" w="med" len="med"/>
-                      <a:tailEnd type="none" w="med" len="med"/>
-                    </a:lnB>
-                    <a:lnTlToBr w="12700" cmpd="sng">
-                      <a:noFill/>
-                      <a:prstDash val="solid"/>
-                    </a:lnTlToBr>
-                    <a:lnBlToTr w="12700" cmpd="sng">
-                      <a:noFill/>
-                      <a:prstDash val="solid"/>
-                    </a:lnBlToTr>
-                  </a:tcPr>
-                </a:tc>
-                <a:tc>
-                  <a:txBody>
-                    <a:bodyPr/>
-                    <a:lstStyle/>
-                    <a:p>
-                      <a:pPr algn="l"/>
-                      <a:r>
-                        <a:rPr lang="en-CA" sz="2800" i="1" dirty="0"/>
-                        <a:t>Software Engineering</a:t>
-                      </a:r>
-                      <a:endParaRPr lang="en-US" sz="2800" i="1" dirty="0"/>
-                    </a:p>
-                  </a:txBody>
-                  <a:tcPr>
-                    <a:lnL w="12700" cap="flat" cmpd="sng" algn="ctr">
-                      <a:noFill/>
-                      <a:prstDash val="solid"/>
-                      <a:round/>
-                      <a:headEnd type="none" w="med" len="med"/>
-                      <a:tailEnd type="none" w="med" len="med"/>
-                    </a:lnL>
-                    <a:lnR w="12700" cap="flat" cmpd="sng" algn="ctr">
-                      <a:noFill/>
-                      <a:prstDash val="solid"/>
-                      <a:round/>
-                      <a:headEnd type="none" w="med" len="med"/>
-                      <a:tailEnd type="none" w="med" len="med"/>
-                    </a:lnR>
-                    <a:lnT w="12700" cap="flat" cmpd="sng" algn="ctr">
-                      <a:noFill/>
-                      <a:prstDash val="solid"/>
-                      <a:round/>
-                      <a:headEnd type="none" w="med" len="med"/>
-                      <a:tailEnd type="none" w="med" len="med"/>
-                    </a:lnT>
-                    <a:lnB w="12700" cap="flat" cmpd="sng" algn="ctr">
-                      <a:noFill/>
-                      <a:prstDash val="solid"/>
-                      <a:round/>
-                      <a:headEnd type="none" w="med" len="med"/>
-                      <a:tailEnd type="none" w="med" len="med"/>
-                    </a:lnB>
-                    <a:lnTlToBr w="12700" cmpd="sng">
-                      <a:noFill/>
-                      <a:prstDash val="solid"/>
-                    </a:lnTlToBr>
-                    <a:lnBlToTr w="12700" cmpd="sng">
-                      <a:noFill/>
-                      <a:prstDash val="solid"/>
-                    </a:lnBlToTr>
-                  </a:tcPr>
-                </a:tc>
-                <a:extLst>
-                  <a:ext uri="{0D108BD9-81ED-4DB2-BD59-A6C34878D82A}">
-                    <a16:rowId xmlns:a16="http://schemas.microsoft.com/office/drawing/2014/main" xmlns="" val="817088776"/>
-                  </a:ext>
-                </a:extLst>
-              </a:tr>
-              <a:tr h="370840">
-                <a:tc>
-                  <a:txBody>
-                    <a:bodyPr/>
-                    <a:lstStyle/>
-                    <a:p>
-                      <a:pPr algn="r"/>
-                      <a:r>
-                        <a:rPr lang="en-US" sz="2800" dirty="0"/>
-                        <a:t>Justin </a:t>
-                      </a:r>
-                      <a:r>
-                        <a:rPr lang="en-US" sz="2800" dirty="0" err="1"/>
-                        <a:t>Kapinski</a:t>
-                      </a:r>
-                      <a:r>
-                        <a:rPr lang="en-US" sz="2800" dirty="0"/>
-                        <a:t> </a:t>
-                      </a:r>
-                    </a:p>
-                  </a:txBody>
-                  <a:tcPr>
-                    <a:lnL w="12700" cap="flat" cmpd="sng" algn="ctr">
-                      <a:noFill/>
-                      <a:prstDash val="solid"/>
-                      <a:round/>
-                      <a:headEnd type="none" w="med" len="med"/>
-                      <a:tailEnd type="none" w="med" len="med"/>
-                    </a:lnL>
-                    <a:lnR w="12700" cap="flat" cmpd="sng" algn="ctr">
-                      <a:noFill/>
-                      <a:prstDash val="solid"/>
-                      <a:round/>
-                      <a:headEnd type="none" w="med" len="med"/>
-                      <a:tailEnd type="none" w="med" len="med"/>
-                    </a:lnR>
-                    <a:lnT w="12700" cap="flat" cmpd="sng" algn="ctr">
-                      <a:noFill/>
-                      <a:prstDash val="solid"/>
-                      <a:round/>
-                      <a:headEnd type="none" w="med" len="med"/>
-                      <a:tailEnd type="none" w="med" len="med"/>
-                    </a:lnT>
-                    <a:lnB w="12700" cap="flat" cmpd="sng" algn="ctr">
-                      <a:noFill/>
-                      <a:prstDash val="solid"/>
-                      <a:round/>
-                      <a:headEnd type="none" w="med" len="med"/>
-                      <a:tailEnd type="none" w="med" len="med"/>
-                    </a:lnB>
-                    <a:lnTlToBr w="12700" cmpd="sng">
-                      <a:noFill/>
-                      <a:prstDash val="solid"/>
-                    </a:lnTlToBr>
-                    <a:lnBlToTr w="12700" cmpd="sng">
-                      <a:noFill/>
-                      <a:prstDash val="solid"/>
-                    </a:lnBlToTr>
-                  </a:tcPr>
-                </a:tc>
-                <a:tc>
-                  <a:txBody>
-                    <a:bodyPr/>
-                    <a:lstStyle/>
-                    <a:p>
-                      <a:pPr algn="ctr"/>
-                      <a:r>
-                        <a:rPr lang="en-CA" sz="2800" dirty="0"/>
-                        <a:t>-</a:t>
-                      </a:r>
-                      <a:endParaRPr lang="en-US" sz="2800" dirty="0"/>
-                    </a:p>
-                  </a:txBody>
-                  <a:tcPr>
-                    <a:lnL w="12700" cap="flat" cmpd="sng" algn="ctr">
-                      <a:noFill/>
-                      <a:prstDash val="solid"/>
-                      <a:round/>
-                      <a:headEnd type="none" w="med" len="med"/>
-                      <a:tailEnd type="none" w="med" len="med"/>
-                    </a:lnL>
-                    <a:lnR w="12700" cap="flat" cmpd="sng" algn="ctr">
-                      <a:noFill/>
-                      <a:prstDash val="solid"/>
-                      <a:round/>
-                      <a:headEnd type="none" w="med" len="med"/>
-                      <a:tailEnd type="none" w="med" len="med"/>
-                    </a:lnR>
-                    <a:lnT w="12700" cap="flat" cmpd="sng" algn="ctr">
-                      <a:noFill/>
-                      <a:prstDash val="solid"/>
-                      <a:round/>
-                      <a:headEnd type="none" w="med" len="med"/>
-                      <a:tailEnd type="none" w="med" len="med"/>
-                    </a:lnT>
-                    <a:lnB w="12700" cap="flat" cmpd="sng" algn="ctr">
-                      <a:noFill/>
-                      <a:prstDash val="solid"/>
-                      <a:round/>
-                      <a:headEnd type="none" w="med" len="med"/>
-                      <a:tailEnd type="none" w="med" len="med"/>
-                    </a:lnB>
-                    <a:lnTlToBr w="12700" cmpd="sng">
-                      <a:noFill/>
-                      <a:prstDash val="solid"/>
-                    </a:lnTlToBr>
-                    <a:lnBlToTr w="12700" cmpd="sng">
-                      <a:noFill/>
-                      <a:prstDash val="solid"/>
-                    </a:lnBlToTr>
-                  </a:tcPr>
-                </a:tc>
-                <a:tc>
-                  <a:txBody>
-                    <a:bodyPr/>
-                    <a:lstStyle/>
-                    <a:p>
-                      <a:pPr algn="l"/>
-                      <a:r>
-                        <a:rPr lang="en-CA" sz="2800" i="1" dirty="0"/>
-                        <a:t>Software Engineering</a:t>
-                      </a:r>
-                      <a:endParaRPr lang="en-US" sz="2800" i="1" dirty="0"/>
-                    </a:p>
-                  </a:txBody>
-                  <a:tcPr>
-                    <a:lnL w="12700" cap="flat" cmpd="sng" algn="ctr">
-                      <a:noFill/>
-                      <a:prstDash val="solid"/>
-                      <a:round/>
-                      <a:headEnd type="none" w="med" len="med"/>
-                      <a:tailEnd type="none" w="med" len="med"/>
-                    </a:lnL>
-                    <a:lnR w="12700" cap="flat" cmpd="sng" algn="ctr">
-                      <a:noFill/>
-                      <a:prstDash val="solid"/>
-                      <a:round/>
-                      <a:headEnd type="none" w="med" len="med"/>
-                      <a:tailEnd type="none" w="med" len="med"/>
-                    </a:lnR>
-                    <a:lnT w="12700" cap="flat" cmpd="sng" algn="ctr">
-                      <a:noFill/>
-                      <a:prstDash val="solid"/>
-                      <a:round/>
-                      <a:headEnd type="none" w="med" len="med"/>
-                      <a:tailEnd type="none" w="med" len="med"/>
-                    </a:lnT>
-                    <a:lnB w="12700" cap="flat" cmpd="sng" algn="ctr">
-                      <a:noFill/>
-                      <a:prstDash val="solid"/>
-                      <a:round/>
-                      <a:headEnd type="none" w="med" len="med"/>
-                      <a:tailEnd type="none" w="med" len="med"/>
-                    </a:lnB>
-                    <a:lnTlToBr w="12700" cmpd="sng">
-                      <a:noFill/>
-                      <a:prstDash val="solid"/>
-                    </a:lnTlToBr>
-                    <a:lnBlToTr w="12700" cmpd="sng">
-                      <a:noFill/>
-                      <a:prstDash val="solid"/>
-                    </a:lnBlToTr>
-                  </a:tcPr>
-                </a:tc>
-                <a:extLst>
-                  <a:ext uri="{0D108BD9-81ED-4DB2-BD59-A6C34878D82A}">
-                    <a16:rowId xmlns:a16="http://schemas.microsoft.com/office/drawing/2014/main" xmlns="" val="294341159"/>
-                  </a:ext>
-                </a:extLst>
-              </a:tr>
-              <a:tr h="370840">
-                <a:tc>
-                  <a:txBody>
-                    <a:bodyPr/>
-                    <a:lstStyle/>
-                    <a:p>
-                      <a:pPr algn="r"/>
-                      <a:r>
-                        <a:rPr lang="en-US" sz="2800" dirty="0"/>
-                        <a:t>Mathew </a:t>
-                      </a:r>
-                      <a:r>
-                        <a:rPr lang="en-US" sz="2800" dirty="0" err="1"/>
-                        <a:t>Hobers</a:t>
-                      </a:r>
-                      <a:endParaRPr lang="en-US" sz="2800" dirty="0"/>
-                    </a:p>
-                  </a:txBody>
-                  <a:tcPr>
-                    <a:lnL w="12700" cap="flat" cmpd="sng" algn="ctr">
-                      <a:noFill/>
-                      <a:prstDash val="solid"/>
-                      <a:round/>
-                      <a:headEnd type="none" w="med" len="med"/>
-                      <a:tailEnd type="none" w="med" len="med"/>
-                    </a:lnL>
-                    <a:lnR w="12700" cap="flat" cmpd="sng" algn="ctr">
-                      <a:noFill/>
-                      <a:prstDash val="solid"/>
-                      <a:round/>
-                      <a:headEnd type="none" w="med" len="med"/>
-                      <a:tailEnd type="none" w="med" len="med"/>
-                    </a:lnR>
-                    <a:lnT w="12700" cap="flat" cmpd="sng" algn="ctr">
-                      <a:noFill/>
-                      <a:prstDash val="solid"/>
-                      <a:round/>
-                      <a:headEnd type="none" w="med" len="med"/>
-                      <a:tailEnd type="none" w="med" len="med"/>
-                    </a:lnT>
-                    <a:lnB w="12700" cap="flat" cmpd="sng" algn="ctr">
-                      <a:noFill/>
-                      <a:prstDash val="solid"/>
-                      <a:round/>
-                      <a:headEnd type="none" w="med" len="med"/>
-                      <a:tailEnd type="none" w="med" len="med"/>
-                    </a:lnB>
-                    <a:lnTlToBr w="12700" cmpd="sng">
-                      <a:noFill/>
-                      <a:prstDash val="solid"/>
-                    </a:lnTlToBr>
-                    <a:lnBlToTr w="12700" cmpd="sng">
-                      <a:noFill/>
-                      <a:prstDash val="solid"/>
-                    </a:lnBlToTr>
-                  </a:tcPr>
-                </a:tc>
-                <a:tc>
-                  <a:txBody>
-                    <a:bodyPr/>
-                    <a:lstStyle/>
-                    <a:p>
-                      <a:pPr algn="ctr"/>
-                      <a:r>
-                        <a:rPr lang="en-CA" sz="2800" dirty="0"/>
-                        <a:t>-</a:t>
-                      </a:r>
-                      <a:endParaRPr lang="en-US" sz="2800" dirty="0"/>
-                    </a:p>
-                  </a:txBody>
-                  <a:tcPr>
-                    <a:lnL w="12700" cap="flat" cmpd="sng" algn="ctr">
-                      <a:noFill/>
-                      <a:prstDash val="solid"/>
-                      <a:round/>
-                      <a:headEnd type="none" w="med" len="med"/>
-                      <a:tailEnd type="none" w="med" len="med"/>
-                    </a:lnL>
-                    <a:lnR w="12700" cap="flat" cmpd="sng" algn="ctr">
-                      <a:noFill/>
-                      <a:prstDash val="solid"/>
-                      <a:round/>
-                      <a:headEnd type="none" w="med" len="med"/>
-                      <a:tailEnd type="none" w="med" len="med"/>
-                    </a:lnR>
-                    <a:lnT w="12700" cap="flat" cmpd="sng" algn="ctr">
-                      <a:noFill/>
-                      <a:prstDash val="solid"/>
-                      <a:round/>
-                      <a:headEnd type="none" w="med" len="med"/>
-                      <a:tailEnd type="none" w="med" len="med"/>
-                    </a:lnT>
-                    <a:lnB w="12700" cap="flat" cmpd="sng" algn="ctr">
-                      <a:noFill/>
-                      <a:prstDash val="solid"/>
-                      <a:round/>
-                      <a:headEnd type="none" w="med" len="med"/>
-                      <a:tailEnd type="none" w="med" len="med"/>
-                    </a:lnB>
-                    <a:lnTlToBr w="12700" cmpd="sng">
-                      <a:noFill/>
-                      <a:prstDash val="solid"/>
-                    </a:lnTlToBr>
-                    <a:lnBlToTr w="12700" cmpd="sng">
-                      <a:noFill/>
-                      <a:prstDash val="solid"/>
-                    </a:lnBlToTr>
-                  </a:tcPr>
-                </a:tc>
-                <a:tc>
-                  <a:txBody>
-                    <a:bodyPr/>
-                    <a:lstStyle/>
-                    <a:p>
-                      <a:pPr algn="l"/>
-                      <a:r>
-                        <a:rPr lang="en-CA" sz="2800" i="1" dirty="0"/>
-                        <a:t>Software Engineering</a:t>
-                      </a:r>
-                      <a:endParaRPr lang="en-US" sz="2800" i="1" dirty="0"/>
-                    </a:p>
-                  </a:txBody>
-                  <a:tcPr>
-                    <a:lnL w="12700" cap="flat" cmpd="sng" algn="ctr">
-                      <a:noFill/>
-                      <a:prstDash val="solid"/>
-                      <a:round/>
-                      <a:headEnd type="none" w="med" len="med"/>
-                      <a:tailEnd type="none" w="med" len="med"/>
-                    </a:lnL>
-                    <a:lnR w="12700" cap="flat" cmpd="sng" algn="ctr">
-                      <a:noFill/>
-                      <a:prstDash val="solid"/>
-                      <a:round/>
-                      <a:headEnd type="none" w="med" len="med"/>
-                      <a:tailEnd type="none" w="med" len="med"/>
-                    </a:lnR>
-                    <a:lnT w="12700" cap="flat" cmpd="sng" algn="ctr">
-                      <a:noFill/>
-                      <a:prstDash val="solid"/>
-                      <a:round/>
-                      <a:headEnd type="none" w="med" len="med"/>
-                      <a:tailEnd type="none" w="med" len="med"/>
-                    </a:lnT>
-                    <a:lnB w="12700" cap="flat" cmpd="sng" algn="ctr">
-                      <a:noFill/>
-                      <a:prstDash val="solid"/>
-                      <a:round/>
-                      <a:headEnd type="none" w="med" len="med"/>
-                      <a:tailEnd type="none" w="med" len="med"/>
-                    </a:lnB>
-                    <a:lnTlToBr w="12700" cmpd="sng">
-                      <a:noFill/>
-                      <a:prstDash val="solid"/>
-                    </a:lnTlToBr>
-                    <a:lnBlToTr w="12700" cmpd="sng">
-                      <a:noFill/>
-                      <a:prstDash val="solid"/>
-                    </a:lnBlToTr>
-                  </a:tcPr>
-                </a:tc>
-                <a:extLst>
-                  <a:ext uri="{0D108BD9-81ED-4DB2-BD59-A6C34878D82A}">
-                    <a16:rowId xmlns:a16="http://schemas.microsoft.com/office/drawing/2014/main" xmlns="" val="3306447196"/>
-                  </a:ext>
-                </a:extLst>
-              </a:tr>
-              <a:tr h="370840">
-                <a:tc>
-                  <a:txBody>
-                    <a:bodyPr/>
-                    <a:lstStyle/>
-                    <a:p>
-                      <a:pPr algn="r"/>
-                      <a:r>
-                        <a:rPr lang="en-CA" sz="2800" dirty="0">
-                          <a:solidFill>
-                            <a:srgbClr val="2A1A00"/>
-                          </a:solidFill>
-                        </a:rPr>
-                        <a:t>Radhika Sharma</a:t>
-                      </a:r>
-                      <a:endParaRPr lang="en-US" sz="2800" dirty="0"/>
-                    </a:p>
-                  </a:txBody>
-                  <a:tcPr>
-                    <a:lnL w="12700" cap="flat" cmpd="sng" algn="ctr">
-                      <a:noFill/>
-                      <a:prstDash val="solid"/>
-                      <a:round/>
-                      <a:headEnd type="none" w="med" len="med"/>
-                      <a:tailEnd type="none" w="med" len="med"/>
-                    </a:lnL>
-                    <a:lnR w="12700" cap="flat" cmpd="sng" algn="ctr">
-                      <a:noFill/>
-                      <a:prstDash val="solid"/>
-                      <a:round/>
-                      <a:headEnd type="none" w="med" len="med"/>
-                      <a:tailEnd type="none" w="med" len="med"/>
-                    </a:lnR>
-                    <a:lnT w="12700" cap="flat" cmpd="sng" algn="ctr">
-                      <a:noFill/>
-                      <a:prstDash val="solid"/>
-                      <a:round/>
-                      <a:headEnd type="none" w="med" len="med"/>
-                      <a:tailEnd type="none" w="med" len="med"/>
-                    </a:lnT>
-                    <a:lnB w="12700" cap="flat" cmpd="sng" algn="ctr">
-                      <a:noFill/>
-                      <a:prstDash val="solid"/>
-                      <a:round/>
-                      <a:headEnd type="none" w="med" len="med"/>
-                      <a:tailEnd type="none" w="med" len="med"/>
-                    </a:lnB>
-                    <a:lnTlToBr w="12700" cmpd="sng">
-                      <a:noFill/>
-                      <a:prstDash val="solid"/>
-                    </a:lnTlToBr>
-                    <a:lnBlToTr w="12700" cmpd="sng">
-                      <a:noFill/>
-                      <a:prstDash val="solid"/>
-                    </a:lnBlToTr>
-                  </a:tcPr>
-                </a:tc>
-                <a:tc>
-                  <a:txBody>
-                    <a:bodyPr/>
-                    <a:lstStyle/>
-                    <a:p>
-                      <a:pPr algn="ctr"/>
-                      <a:r>
-                        <a:rPr lang="en-CA" sz="2800" dirty="0"/>
-                        <a:t>-</a:t>
-                      </a:r>
-                      <a:endParaRPr lang="en-US" sz="2800" dirty="0"/>
-                    </a:p>
-                  </a:txBody>
-                  <a:tcPr>
-                    <a:lnL w="12700" cap="flat" cmpd="sng" algn="ctr">
-                      <a:noFill/>
-                      <a:prstDash val="solid"/>
-                      <a:round/>
-                      <a:headEnd type="none" w="med" len="med"/>
-                      <a:tailEnd type="none" w="med" len="med"/>
-                    </a:lnL>
-                    <a:lnR w="12700" cap="flat" cmpd="sng" algn="ctr">
-                      <a:noFill/>
-                      <a:prstDash val="solid"/>
-                      <a:round/>
-                      <a:headEnd type="none" w="med" len="med"/>
-                      <a:tailEnd type="none" w="med" len="med"/>
-                    </a:lnR>
-                    <a:lnT w="12700" cap="flat" cmpd="sng" algn="ctr">
-                      <a:noFill/>
-                      <a:prstDash val="solid"/>
-                      <a:round/>
-                      <a:headEnd type="none" w="med" len="med"/>
-                      <a:tailEnd type="none" w="med" len="med"/>
-                    </a:lnT>
-                    <a:lnB w="12700" cap="flat" cmpd="sng" algn="ctr">
-                      <a:noFill/>
-                      <a:prstDash val="solid"/>
-                      <a:round/>
-                      <a:headEnd type="none" w="med" len="med"/>
-                      <a:tailEnd type="none" w="med" len="med"/>
-                    </a:lnB>
-                    <a:lnTlToBr w="12700" cmpd="sng">
-                      <a:noFill/>
-                      <a:prstDash val="solid"/>
-                    </a:lnTlToBr>
-                    <a:lnBlToTr w="12700" cmpd="sng">
-                      <a:noFill/>
-                      <a:prstDash val="solid"/>
-                    </a:lnBlToTr>
-                  </a:tcPr>
-                </a:tc>
-                <a:tc>
-                  <a:txBody>
-                    <a:bodyPr/>
-                    <a:lstStyle/>
-                    <a:p>
-                      <a:pPr algn="l"/>
-                      <a:r>
-                        <a:rPr lang="en-CA" sz="2800" i="1" dirty="0"/>
-                        <a:t>Software Engineering – Embedded Systems</a:t>
-                      </a:r>
-                      <a:endParaRPr lang="en-US" sz="2800" i="1" dirty="0"/>
-                    </a:p>
-                  </a:txBody>
-                  <a:tcPr>
-                    <a:lnL w="12700" cap="flat" cmpd="sng" algn="ctr">
-                      <a:noFill/>
-                      <a:prstDash val="solid"/>
-                      <a:round/>
-                      <a:headEnd type="none" w="med" len="med"/>
-                      <a:tailEnd type="none" w="med" len="med"/>
-                    </a:lnL>
-                    <a:lnR w="12700" cap="flat" cmpd="sng" algn="ctr">
-                      <a:noFill/>
-                      <a:prstDash val="solid"/>
-                      <a:round/>
-                      <a:headEnd type="none" w="med" len="med"/>
-                      <a:tailEnd type="none" w="med" len="med"/>
-                    </a:lnR>
-                    <a:lnT w="12700" cap="flat" cmpd="sng" algn="ctr">
-                      <a:noFill/>
-                      <a:prstDash val="solid"/>
-                      <a:round/>
-                      <a:headEnd type="none" w="med" len="med"/>
-                      <a:tailEnd type="none" w="med" len="med"/>
-                    </a:lnT>
-                    <a:lnB w="12700" cap="flat" cmpd="sng" algn="ctr">
-                      <a:noFill/>
-                      <a:prstDash val="solid"/>
-                      <a:round/>
-                      <a:headEnd type="none" w="med" len="med"/>
-                      <a:tailEnd type="none" w="med" len="med"/>
-                    </a:lnB>
-                    <a:lnTlToBr w="12700" cmpd="sng">
-                      <a:noFill/>
-                      <a:prstDash val="solid"/>
-                    </a:lnTlToBr>
-                    <a:lnBlToTr w="12700" cmpd="sng">
-                      <a:noFill/>
-                      <a:prstDash val="solid"/>
-                    </a:lnBlToTr>
-                  </a:tcPr>
-                </a:tc>
-                <a:extLst>
-                  <a:ext uri="{0D108BD9-81ED-4DB2-BD59-A6C34878D82A}">
-                    <a16:rowId xmlns:a16="http://schemas.microsoft.com/office/drawing/2014/main" xmlns="" val="2448494909"/>
-                  </a:ext>
-                </a:extLst>
-              </a:tr>
-            </a:tbl>
-          </a:graphicData>
-        </a:graphic>
-      </p:graphicFrame>
-    </p:spTree>
-    <p:extLst>
-      <p:ext uri="{BB962C8B-B14F-4D97-AF65-F5344CB8AC3E}">
-        <p14:creationId xmlns:p14="http://schemas.microsoft.com/office/powerpoint/2010/main" val="1390596968"/>
-      </p:ext>
-    </p:extLst>
-  </p:cSld>
-  <p:clrMapOvr>
-    <a:masterClrMapping/>
-  </p:clrMapOvr>
-  <p:timing>
-    <p:tnLst>
-      <p:par>
-        <p:cTn id="1" dur="indefinite" restart="never" nodeType="tmRoot"/>
-      </p:par>
-    </p:tnLst>
-  </p:timing>
 </p:sld>
 </file>
 
@@ -15719,7 +16519,7 @@
               </a:lnSpc>
             </a:pPr>
             <a:r>
-              <a:rPr lang="en-CA" sz="7200" dirty="0" smtClean="0">
+              <a:rPr lang="en-CA" sz="7200" dirty="0">
                 <a:solidFill>
                   <a:srgbClr val="2A1A00"/>
                 </a:solidFill>
@@ -15770,21 +16570,8 @@
                   <a:srgbClr val="2A1A00"/>
                 </a:solidFill>
               </a:rPr>
-              <a:t>Intersection </a:t>
+              <a:t>Intersection Controller (IC)</a:t>
             </a:r>
-            <a:r>
-              <a:rPr lang="en-CA" sz="3600" dirty="0" smtClean="0">
-                <a:solidFill>
-                  <a:srgbClr val="2A1A00"/>
-                </a:solidFill>
-              </a:rPr>
-              <a:t>Controller (IC)</a:t>
-            </a:r>
-            <a:endParaRPr lang="en-CA" sz="3600" dirty="0">
-              <a:solidFill>
-                <a:srgbClr val="2A1A00"/>
-              </a:solidFill>
-            </a:endParaRPr>
           </a:p>
           <a:p>
             <a:pPr lvl="1"/>
@@ -15809,7 +16596,7 @@
             <a:pPr marL="457200" lvl="1" indent="0">
               <a:buNone/>
             </a:pPr>
-            <a:endParaRPr lang="en-CA" sz="3200" dirty="0" smtClean="0">
+            <a:endParaRPr lang="en-CA" sz="3200" dirty="0">
               <a:solidFill>
                 <a:srgbClr val="2A1A00"/>
               </a:solidFill>
@@ -15822,21 +16609,8 @@
                   <a:schemeClr val="tx1"/>
                 </a:solidFill>
               </a:rPr>
-              <a:t>Vehicle Controller </a:t>
+              <a:t>Vehicle Controller (VC)</a:t>
             </a:r>
-            <a:r>
-              <a:rPr lang="en-CA" sz="3600" dirty="0" smtClean="0">
-                <a:solidFill>
-                  <a:schemeClr val="tx1"/>
-                </a:solidFill>
-              </a:rPr>
-              <a:t>(VC)</a:t>
-            </a:r>
-            <a:endParaRPr lang="en-CA" sz="3600" dirty="0">
-              <a:solidFill>
-                <a:schemeClr val="tx1"/>
-              </a:solidFill>
-            </a:endParaRPr>
           </a:p>
           <a:p>
             <a:pPr lvl="1"/>
@@ -15877,13 +16651,6 @@
   <p:clrMapOvr>
     <a:masterClrMapping/>
   </p:clrMapOvr>
-  <p:timing>
-    <p:tnLst>
-      <p:par>
-        <p:cTn id="1" dur="indefinite" restart="never" nodeType="tmRoot"/>
-      </p:par>
-    </p:tnLst>
-  </p:timing>
 </p:sld>
 </file>
 
@@ -18229,55 +18996,29 @@
           <a:lstStyle/>
           <a:p>
             <a:r>
-              <a:rPr lang="en-CA" sz="3200" dirty="0" smtClean="0">
-                <a:solidFill>
-                  <a:srgbClr val="2A1A00"/>
-                </a:solidFill>
-              </a:rPr>
-              <a:t>Why </a:t>
-            </a:r>
-            <a:r>
               <a:rPr lang="en-CA" sz="3200" dirty="0">
                 <a:solidFill>
                   <a:srgbClr val="2A1A00"/>
                 </a:solidFill>
               </a:rPr>
-              <a:t>an IC? </a:t>
+              <a:t>Why an IC? </a:t>
             </a:r>
-            <a:endParaRPr lang="en-CA" sz="3200" dirty="0" smtClean="0">
-              <a:solidFill>
-                <a:srgbClr val="2A1A00"/>
-              </a:solidFill>
-            </a:endParaRPr>
           </a:p>
           <a:p>
             <a:pPr lvl="1"/>
-            <a:r>
-              <a:rPr lang="en-CA" sz="2800" dirty="0" smtClean="0">
-                <a:solidFill>
-                  <a:srgbClr val="2A1A00"/>
-                </a:solidFill>
-              </a:rPr>
-              <a:t>Efficient </a:t>
-            </a:r>
             <a:r>
               <a:rPr lang="en-CA" sz="2800" dirty="0">
                 <a:solidFill>
                   <a:srgbClr val="2A1A00"/>
                 </a:solidFill>
               </a:rPr>
-              <a:t>traffic flow </a:t>
+              <a:t>Efficient traffic flow </a:t>
             </a:r>
-            <a:endParaRPr lang="en-CA" sz="2800" dirty="0">
-              <a:solidFill>
-                <a:srgbClr val="2A1A00"/>
-              </a:solidFill>
-            </a:endParaRPr>
           </a:p>
           <a:p>
             <a:pPr lvl="1"/>
             <a:r>
-              <a:rPr lang="en-CA" sz="2800" dirty="0" smtClean="0">
+              <a:rPr lang="en-CA" sz="2800" dirty="0">
                 <a:solidFill>
                   <a:srgbClr val="2A1A00"/>
                 </a:solidFill>
@@ -18289,7 +19030,7 @@
             <a:pPr marL="457200" lvl="1" indent="0">
               <a:buNone/>
             </a:pPr>
-            <a:endParaRPr lang="en-CA" sz="2800" dirty="0" smtClean="0">
+            <a:endParaRPr lang="en-CA" sz="2800" dirty="0">
               <a:solidFill>
                 <a:srgbClr val="2A1A00"/>
               </a:solidFill>
@@ -18444,10 +19185,9 @@
           <a:p>
             <a:pPr algn="ctr"/>
             <a:r>
-              <a:rPr lang="en-CA" dirty="0" smtClean="0"/>
+              <a:rPr lang="en-CA" dirty="0"/>
               <a:t>Communication</a:t>
             </a:r>
-            <a:endParaRPr lang="en-CA" dirty="0"/>
           </a:p>
         </p:txBody>
       </p:sp>
@@ -18528,18 +19268,13 @@
               <a:rPr lang="en-CA" dirty="0"/>
               <a:t>Vehicle </a:t>
             </a:r>
-            <a:r>
-              <a:rPr lang="en-CA" dirty="0" smtClean="0"/>
-              <a:t/>
-            </a:r>
             <a:br>
-              <a:rPr lang="en-CA" dirty="0" smtClean="0"/>
+              <a:rPr lang="en-CA" dirty="0"/>
             </a:br>
             <a:r>
-              <a:rPr lang="en-CA" dirty="0" smtClean="0"/>
+              <a:rPr lang="en-CA" dirty="0"/>
               <a:t>Controller</a:t>
             </a:r>
-            <a:endParaRPr lang="en-CA" dirty="0"/>
           </a:p>
         </p:txBody>
       </p:sp>
@@ -18586,17 +19321,16 @@
           <a:p>
             <a:pPr algn="ctr"/>
             <a:r>
-              <a:rPr lang="en-CA" dirty="0" smtClean="0"/>
+              <a:rPr lang="en-CA" dirty="0"/>
               <a:t>INTERSECTION </a:t>
             </a:r>
             <a:br>
-              <a:rPr lang="en-CA" dirty="0" smtClean="0"/>
+              <a:rPr lang="en-CA" dirty="0"/>
             </a:br>
             <a:r>
-              <a:rPr lang="en-CA" dirty="0" smtClean="0"/>
+              <a:rPr lang="en-CA" dirty="0"/>
               <a:t>Controller</a:t>
             </a:r>
-            <a:endParaRPr lang="en-CA" dirty="0"/>
           </a:p>
         </p:txBody>
       </p:sp>

</xml_diff>